<commit_message>
Finished draft of exploration slides
</commit_message>
<xml_diff>
--- a/media/Final Project - Employment Prosepects.pptx
+++ b/media/Final Project - Employment Prosepects.pptx
@@ -21,26 +21,30 @@
     <p:sldId id="266" r:id="rId16"/>
     <p:sldId id="267" r:id="rId17"/>
     <p:sldId id="268" r:id="rId18"/>
+    <p:sldId id="269" r:id="rId19"/>
+    <p:sldId id="270" r:id="rId20"/>
+    <p:sldId id="271" r:id="rId21"/>
+    <p:sldId id="272" r:id="rId22"/>
   </p:sldIdLst>
   <p:sldSz cy="5143500" cx="9144000"/>
   <p:notesSz cx="6858000" cy="9144000"/>
   <p:embeddedFontLst>
     <p:embeddedFont>
       <p:font typeface="Nunito"/>
-      <p:regular r:id="rId19"/>
-      <p:bold r:id="rId20"/>
-      <p:italic r:id="rId21"/>
-      <p:boldItalic r:id="rId22"/>
+      <p:regular r:id="rId23"/>
+      <p:bold r:id="rId24"/>
+      <p:italic r:id="rId25"/>
+      <p:boldItalic r:id="rId26"/>
     </p:embeddedFont>
     <p:embeddedFont>
       <p:font typeface="Maven Pro"/>
-      <p:regular r:id="rId23"/>
-      <p:bold r:id="rId24"/>
+      <p:regular r:id="rId27"/>
+      <p:bold r:id="rId28"/>
     </p:embeddedFont>
     <p:embeddedFont>
       <p:font typeface="Comfortaa"/>
-      <p:regular r:id="rId25"/>
-      <p:bold r:id="rId26"/>
+      <p:regular r:id="rId29"/>
+      <p:bold r:id="rId30"/>
     </p:embeddedFont>
   </p:embeddedFontLst>
   <p:defaultTextStyle>
@@ -835,7 +839,7 @@
       </p:grpSpPr>
       <p:sp>
         <p:nvSpPr>
-          <p:cNvPr id="336" name="Google Shape;336;g129b6330eb3_0_357:notes"/>
+          <p:cNvPr id="336" name="Google Shape;336;g129c47ed3ce_0_10:notes"/>
           <p:cNvSpPr/>
           <p:nvPr>
             <p:ph idx="2" type="sldImg"/>
@@ -870,7 +874,7 @@
       </p:sp>
       <p:sp>
         <p:nvSpPr>
-          <p:cNvPr id="337" name="Google Shape;337;g129b6330eb3_0_357:notes"/>
+          <p:cNvPr id="337" name="Google Shape;337;g129c47ed3ce_0_10:notes"/>
           <p:cNvSpPr txBox="1"/>
           <p:nvPr>
             <p:ph idx="1" type="body"/>
@@ -920,7 +924,7 @@
   <p:cSld>
     <p:spTree>
       <p:nvGrpSpPr>
-        <p:cNvPr id="340" name="Shape 340"/>
+        <p:cNvPr id="343" name="Shape 343"/>
         <p:cNvGrpSpPr/>
         <p:nvPr/>
       </p:nvGrpSpPr>
@@ -934,7 +938,7 @@
       </p:grpSpPr>
       <p:sp>
         <p:nvSpPr>
-          <p:cNvPr id="341" name="Google Shape;341;g129b6330eb3_0_361:notes"/>
+          <p:cNvPr id="344" name="Google Shape;344;g129c47ed3ce_0_17:notes"/>
           <p:cNvSpPr/>
           <p:nvPr>
             <p:ph idx="2" type="sldImg"/>
@@ -969,7 +973,7 @@
       </p:sp>
       <p:sp>
         <p:nvSpPr>
-          <p:cNvPr id="342" name="Google Shape;342;g129b6330eb3_0_361:notes"/>
+          <p:cNvPr id="345" name="Google Shape;345;g129c47ed3ce_0_17:notes"/>
           <p:cNvSpPr txBox="1"/>
           <p:nvPr>
             <p:ph idx="1" type="body"/>
@@ -1019,7 +1023,7 @@
   <p:cSld>
     <p:spTree>
       <p:nvGrpSpPr>
-        <p:cNvPr id="346" name="Shape 346"/>
+        <p:cNvPr id="350" name="Shape 350"/>
         <p:cNvGrpSpPr/>
         <p:nvPr/>
       </p:nvGrpSpPr>
@@ -1033,7 +1037,7 @@
       </p:grpSpPr>
       <p:sp>
         <p:nvSpPr>
-          <p:cNvPr id="347" name="Google Shape;347;g129b6330eb3_0_366:notes"/>
+          <p:cNvPr id="351" name="Google Shape;351;g129b6330eb3_0_357:notes"/>
           <p:cNvSpPr/>
           <p:nvPr>
             <p:ph idx="2" type="sldImg"/>
@@ -1068,7 +1072,7 @@
       </p:sp>
       <p:sp>
         <p:nvSpPr>
-          <p:cNvPr id="348" name="Google Shape;348;g129b6330eb3_0_366:notes"/>
+          <p:cNvPr id="352" name="Google Shape;352;g129b6330eb3_0_357:notes"/>
           <p:cNvSpPr txBox="1"/>
           <p:nvPr>
             <p:ph idx="1" type="body"/>
@@ -1118,7 +1122,7 @@
   <p:cSld>
     <p:spTree>
       <p:nvGrpSpPr>
-        <p:cNvPr id="351" name="Shape 351"/>
+        <p:cNvPr id="355" name="Shape 355"/>
         <p:cNvGrpSpPr/>
         <p:nvPr/>
       </p:nvGrpSpPr>
@@ -1132,7 +1136,7 @@
       </p:grpSpPr>
       <p:sp>
         <p:nvSpPr>
-          <p:cNvPr id="352" name="Google Shape;352;g129b6330eb3_0_370:notes"/>
+          <p:cNvPr id="356" name="Google Shape;356;g129b6330eb3_0_361:notes"/>
           <p:cNvSpPr/>
           <p:nvPr>
             <p:ph idx="2" type="sldImg"/>
@@ -1167,7 +1171,403 @@
       </p:sp>
       <p:sp>
         <p:nvSpPr>
-          <p:cNvPr id="353" name="Google Shape;353;g129b6330eb3_0_370:notes"/>
+          <p:cNvPr id="357" name="Google Shape;357;g129b6330eb3_0_361:notes"/>
+          <p:cNvSpPr txBox="1"/>
+          <p:nvPr>
+            <p:ph idx="1" type="body"/>
+          </p:nvPr>
+        </p:nvSpPr>
+        <p:spPr>
+          <a:xfrm>
+            <a:off x="685800" y="4343400"/>
+            <a:ext cx="5486400" cy="4114800"/>
+          </a:xfrm>
+          <a:prstGeom prst="rect">
+            <a:avLst/>
+          </a:prstGeom>
+        </p:spPr>
+        <p:txBody>
+          <a:bodyPr anchorCtr="0" anchor="t" bIns="91425" lIns="91425" spcFirstLastPara="1" rIns="91425" wrap="square" tIns="91425">
+            <a:noAutofit/>
+          </a:bodyPr>
+          <a:lstStyle/>
+          <a:p>
+            <a:pPr indent="0" lvl="0" marL="0" rtl="0" algn="l">
+              <a:spcBef>
+                <a:spcPts val="0"/>
+              </a:spcBef>
+              <a:spcAft>
+                <a:spcPts val="0"/>
+              </a:spcAft>
+              <a:buNone/>
+            </a:pPr>
+            <a:r>
+              <a:t/>
+            </a:r>
+            <a:endParaRPr/>
+          </a:p>
+        </p:txBody>
+      </p:sp>
+    </p:spTree>
+  </p:cSld>
+  <p:clrMapOvr>
+    <a:masterClrMapping/>
+  </p:clrMapOvr>
+</p:notes>
+</file>
+
+<file path=ppt/notesSlides/notesSlide14.xml><?xml version="1.0" encoding="utf-8"?>
+<p:notes xmlns:a="http://schemas.openxmlformats.org/drawingml/2006/main" xmlns:r="http://schemas.openxmlformats.org/officeDocument/2006/relationships" xmlns:mc="http://schemas.openxmlformats.org/markup-compatibility/2006" xmlns:mv="urn:schemas-microsoft-com:mac:vml" xmlns:p="http://schemas.openxmlformats.org/presentationml/2006/main" xmlns:c="http://schemas.openxmlformats.org/drawingml/2006/chart" xmlns:dgm="http://schemas.openxmlformats.org/drawingml/2006/diagram" xmlns:o="urn:schemas-microsoft-com:office:office" xmlns:v="urn:schemas-microsoft-com:vml" xmlns:pvml="urn:schemas-microsoft-com:office:powerpoint" xmlns:com="http://schemas.openxmlformats.org/drawingml/2006/compatibility" xmlns:p14="http://schemas.microsoft.com/office/powerpoint/2010/main" xmlns:p15="http://schemas.microsoft.com/office/powerpoint/2012/main" xmlns:ahyp="http://schemas.microsoft.com/office/drawing/2018/hyperlinkcolor" showMasterPhAnim="0" showMasterSp="0">
+  <p:cSld>
+    <p:spTree>
+      <p:nvGrpSpPr>
+        <p:cNvPr id="361" name="Shape 361"/>
+        <p:cNvGrpSpPr/>
+        <p:nvPr/>
+      </p:nvGrpSpPr>
+      <p:grpSpPr>
+        <a:xfrm>
+          <a:off x="0" y="0"/>
+          <a:ext cx="0" cy="0"/>
+          <a:chOff x="0" y="0"/>
+          <a:chExt cx="0" cy="0"/>
+        </a:xfrm>
+      </p:grpSpPr>
+      <p:sp>
+        <p:nvSpPr>
+          <p:cNvPr id="362" name="Google Shape;362;g129b6330eb3_0_366:notes"/>
+          <p:cNvSpPr/>
+          <p:nvPr>
+            <p:ph idx="2" type="sldImg"/>
+          </p:nvPr>
+        </p:nvSpPr>
+        <p:spPr>
+          <a:xfrm>
+            <a:off x="381300" y="685800"/>
+            <a:ext cx="6096000" cy="3429000"/>
+          </a:xfrm>
+          <a:custGeom>
+            <a:rect b="b" l="l" r="r" t="t"/>
+            <a:pathLst>
+              <a:path extrusionOk="0" h="120000" w="120000">
+                <a:moveTo>
+                  <a:pt x="0" y="0"/>
+                </a:moveTo>
+                <a:lnTo>
+                  <a:pt x="120000" y="0"/>
+                </a:lnTo>
+                <a:lnTo>
+                  <a:pt x="120000" y="120000"/>
+                </a:lnTo>
+                <a:lnTo>
+                  <a:pt x="0" y="120000"/>
+                </a:lnTo>
+                <a:close/>
+              </a:path>
+            </a:pathLst>
+          </a:custGeom>
+        </p:spPr>
+      </p:sp>
+      <p:sp>
+        <p:nvSpPr>
+          <p:cNvPr id="363" name="Google Shape;363;g129b6330eb3_0_366:notes"/>
+          <p:cNvSpPr txBox="1"/>
+          <p:nvPr>
+            <p:ph idx="1" type="body"/>
+          </p:nvPr>
+        </p:nvSpPr>
+        <p:spPr>
+          <a:xfrm>
+            <a:off x="685800" y="4343400"/>
+            <a:ext cx="5486400" cy="4114800"/>
+          </a:xfrm>
+          <a:prstGeom prst="rect">
+            <a:avLst/>
+          </a:prstGeom>
+        </p:spPr>
+        <p:txBody>
+          <a:bodyPr anchorCtr="0" anchor="t" bIns="91425" lIns="91425" spcFirstLastPara="1" rIns="91425" wrap="square" tIns="91425">
+            <a:noAutofit/>
+          </a:bodyPr>
+          <a:lstStyle/>
+          <a:p>
+            <a:pPr indent="0" lvl="0" marL="0" rtl="0" algn="l">
+              <a:spcBef>
+                <a:spcPts val="0"/>
+              </a:spcBef>
+              <a:spcAft>
+                <a:spcPts val="0"/>
+              </a:spcAft>
+              <a:buNone/>
+            </a:pPr>
+            <a:r>
+              <a:t/>
+            </a:r>
+            <a:endParaRPr/>
+          </a:p>
+        </p:txBody>
+      </p:sp>
+    </p:spTree>
+  </p:cSld>
+  <p:clrMapOvr>
+    <a:masterClrMapping/>
+  </p:clrMapOvr>
+</p:notes>
+</file>
+
+<file path=ppt/notesSlides/notesSlide15.xml><?xml version="1.0" encoding="utf-8"?>
+<p:notes xmlns:a="http://schemas.openxmlformats.org/drawingml/2006/main" xmlns:r="http://schemas.openxmlformats.org/officeDocument/2006/relationships" xmlns:mc="http://schemas.openxmlformats.org/markup-compatibility/2006" xmlns:mv="urn:schemas-microsoft-com:mac:vml" xmlns:p="http://schemas.openxmlformats.org/presentationml/2006/main" xmlns:c="http://schemas.openxmlformats.org/drawingml/2006/chart" xmlns:dgm="http://schemas.openxmlformats.org/drawingml/2006/diagram" xmlns:o="urn:schemas-microsoft-com:office:office" xmlns:v="urn:schemas-microsoft-com:vml" xmlns:pvml="urn:schemas-microsoft-com:office:powerpoint" xmlns:com="http://schemas.openxmlformats.org/drawingml/2006/compatibility" xmlns:p14="http://schemas.microsoft.com/office/powerpoint/2010/main" xmlns:p15="http://schemas.microsoft.com/office/powerpoint/2012/main" xmlns:ahyp="http://schemas.microsoft.com/office/drawing/2018/hyperlinkcolor" showMasterPhAnim="0" showMasterSp="0">
+  <p:cSld>
+    <p:spTree>
+      <p:nvGrpSpPr>
+        <p:cNvPr id="366" name="Shape 366"/>
+        <p:cNvGrpSpPr/>
+        <p:nvPr/>
+      </p:nvGrpSpPr>
+      <p:grpSpPr>
+        <a:xfrm>
+          <a:off x="0" y="0"/>
+          <a:ext cx="0" cy="0"/>
+          <a:chOff x="0" y="0"/>
+          <a:chExt cx="0" cy="0"/>
+        </a:xfrm>
+      </p:grpSpPr>
+      <p:sp>
+        <p:nvSpPr>
+          <p:cNvPr id="367" name="Google Shape;367;g129b6330eb3_0_370:notes"/>
+          <p:cNvSpPr/>
+          <p:nvPr>
+            <p:ph idx="2" type="sldImg"/>
+          </p:nvPr>
+        </p:nvSpPr>
+        <p:spPr>
+          <a:xfrm>
+            <a:off x="381300" y="685800"/>
+            <a:ext cx="6096000" cy="3429000"/>
+          </a:xfrm>
+          <a:custGeom>
+            <a:rect b="b" l="l" r="r" t="t"/>
+            <a:pathLst>
+              <a:path extrusionOk="0" h="120000" w="120000">
+                <a:moveTo>
+                  <a:pt x="0" y="0"/>
+                </a:moveTo>
+                <a:lnTo>
+                  <a:pt x="120000" y="0"/>
+                </a:lnTo>
+                <a:lnTo>
+                  <a:pt x="120000" y="120000"/>
+                </a:lnTo>
+                <a:lnTo>
+                  <a:pt x="0" y="120000"/>
+                </a:lnTo>
+                <a:close/>
+              </a:path>
+            </a:pathLst>
+          </a:custGeom>
+        </p:spPr>
+      </p:sp>
+      <p:sp>
+        <p:nvSpPr>
+          <p:cNvPr id="368" name="Google Shape;368;g129b6330eb3_0_370:notes"/>
+          <p:cNvSpPr txBox="1"/>
+          <p:nvPr>
+            <p:ph idx="1" type="body"/>
+          </p:nvPr>
+        </p:nvSpPr>
+        <p:spPr>
+          <a:xfrm>
+            <a:off x="685800" y="4343400"/>
+            <a:ext cx="5486400" cy="4114800"/>
+          </a:xfrm>
+          <a:prstGeom prst="rect">
+            <a:avLst/>
+          </a:prstGeom>
+        </p:spPr>
+        <p:txBody>
+          <a:bodyPr anchorCtr="0" anchor="t" bIns="91425" lIns="91425" spcFirstLastPara="1" rIns="91425" wrap="square" tIns="91425">
+            <a:noAutofit/>
+          </a:bodyPr>
+          <a:lstStyle/>
+          <a:p>
+            <a:pPr indent="0" lvl="0" marL="0" rtl="0" algn="l">
+              <a:spcBef>
+                <a:spcPts val="0"/>
+              </a:spcBef>
+              <a:spcAft>
+                <a:spcPts val="0"/>
+              </a:spcAft>
+              <a:buNone/>
+            </a:pPr>
+            <a:r>
+              <a:t/>
+            </a:r>
+            <a:endParaRPr/>
+          </a:p>
+        </p:txBody>
+      </p:sp>
+    </p:spTree>
+  </p:cSld>
+  <p:clrMapOvr>
+    <a:masterClrMapping/>
+  </p:clrMapOvr>
+</p:notes>
+</file>
+
+<file path=ppt/notesSlides/notesSlide16.xml><?xml version="1.0" encoding="utf-8"?>
+<p:notes xmlns:a="http://schemas.openxmlformats.org/drawingml/2006/main" xmlns:r="http://schemas.openxmlformats.org/officeDocument/2006/relationships" xmlns:mc="http://schemas.openxmlformats.org/markup-compatibility/2006" xmlns:mv="urn:schemas-microsoft-com:mac:vml" xmlns:p="http://schemas.openxmlformats.org/presentationml/2006/main" xmlns:c="http://schemas.openxmlformats.org/drawingml/2006/chart" xmlns:dgm="http://schemas.openxmlformats.org/drawingml/2006/diagram" xmlns:o="urn:schemas-microsoft-com:office:office" xmlns:v="urn:schemas-microsoft-com:vml" xmlns:pvml="urn:schemas-microsoft-com:office:powerpoint" xmlns:com="http://schemas.openxmlformats.org/drawingml/2006/compatibility" xmlns:p14="http://schemas.microsoft.com/office/powerpoint/2010/main" xmlns:p15="http://schemas.microsoft.com/office/powerpoint/2012/main" xmlns:ahyp="http://schemas.microsoft.com/office/drawing/2018/hyperlinkcolor" showMasterPhAnim="0" showMasterSp="0">
+  <p:cSld>
+    <p:spTree>
+      <p:nvGrpSpPr>
+        <p:cNvPr id="372" name="Shape 372"/>
+        <p:cNvGrpSpPr/>
+        <p:nvPr/>
+      </p:nvGrpSpPr>
+      <p:grpSpPr>
+        <a:xfrm>
+          <a:off x="0" y="0"/>
+          <a:ext cx="0" cy="0"/>
+          <a:chOff x="0" y="0"/>
+          <a:chExt cx="0" cy="0"/>
+        </a:xfrm>
+      </p:grpSpPr>
+      <p:sp>
+        <p:nvSpPr>
+          <p:cNvPr id="373" name="Google Shape;373;g129c47ed3ce_0_0:notes"/>
+          <p:cNvSpPr/>
+          <p:nvPr>
+            <p:ph idx="2" type="sldImg"/>
+          </p:nvPr>
+        </p:nvSpPr>
+        <p:spPr>
+          <a:xfrm>
+            <a:off x="381300" y="685800"/>
+            <a:ext cx="6096000" cy="3429000"/>
+          </a:xfrm>
+          <a:custGeom>
+            <a:rect b="b" l="l" r="r" t="t"/>
+            <a:pathLst>
+              <a:path extrusionOk="0" h="120000" w="120000">
+                <a:moveTo>
+                  <a:pt x="0" y="0"/>
+                </a:moveTo>
+                <a:lnTo>
+                  <a:pt x="120000" y="0"/>
+                </a:lnTo>
+                <a:lnTo>
+                  <a:pt x="120000" y="120000"/>
+                </a:lnTo>
+                <a:lnTo>
+                  <a:pt x="0" y="120000"/>
+                </a:lnTo>
+                <a:close/>
+              </a:path>
+            </a:pathLst>
+          </a:custGeom>
+        </p:spPr>
+      </p:sp>
+      <p:sp>
+        <p:nvSpPr>
+          <p:cNvPr id="374" name="Google Shape;374;g129c47ed3ce_0_0:notes"/>
+          <p:cNvSpPr txBox="1"/>
+          <p:nvPr>
+            <p:ph idx="1" type="body"/>
+          </p:nvPr>
+        </p:nvSpPr>
+        <p:spPr>
+          <a:xfrm>
+            <a:off x="685800" y="4343400"/>
+            <a:ext cx="5486400" cy="4114800"/>
+          </a:xfrm>
+          <a:prstGeom prst="rect">
+            <a:avLst/>
+          </a:prstGeom>
+        </p:spPr>
+        <p:txBody>
+          <a:bodyPr anchorCtr="0" anchor="t" bIns="91425" lIns="91425" spcFirstLastPara="1" rIns="91425" wrap="square" tIns="91425">
+            <a:noAutofit/>
+          </a:bodyPr>
+          <a:lstStyle/>
+          <a:p>
+            <a:pPr indent="0" lvl="0" marL="0" rtl="0" algn="l">
+              <a:spcBef>
+                <a:spcPts val="0"/>
+              </a:spcBef>
+              <a:spcAft>
+                <a:spcPts val="0"/>
+              </a:spcAft>
+              <a:buNone/>
+            </a:pPr>
+            <a:r>
+              <a:t/>
+            </a:r>
+            <a:endParaRPr/>
+          </a:p>
+        </p:txBody>
+      </p:sp>
+    </p:spTree>
+  </p:cSld>
+  <p:clrMapOvr>
+    <a:masterClrMapping/>
+  </p:clrMapOvr>
+</p:notes>
+</file>
+
+<file path=ppt/notesSlides/notesSlide17.xml><?xml version="1.0" encoding="utf-8"?>
+<p:notes xmlns:a="http://schemas.openxmlformats.org/drawingml/2006/main" xmlns:r="http://schemas.openxmlformats.org/officeDocument/2006/relationships" xmlns:mc="http://schemas.openxmlformats.org/markup-compatibility/2006" xmlns:mv="urn:schemas-microsoft-com:mac:vml" xmlns:p="http://schemas.openxmlformats.org/presentationml/2006/main" xmlns:c="http://schemas.openxmlformats.org/drawingml/2006/chart" xmlns:dgm="http://schemas.openxmlformats.org/drawingml/2006/diagram" xmlns:o="urn:schemas-microsoft-com:office:office" xmlns:v="urn:schemas-microsoft-com:vml" xmlns:pvml="urn:schemas-microsoft-com:office:powerpoint" xmlns:com="http://schemas.openxmlformats.org/drawingml/2006/compatibility" xmlns:p14="http://schemas.microsoft.com/office/powerpoint/2010/main" xmlns:p15="http://schemas.microsoft.com/office/powerpoint/2012/main" xmlns:ahyp="http://schemas.microsoft.com/office/drawing/2018/hyperlinkcolor" showMasterPhAnim="0" showMasterSp="0">
+  <p:cSld>
+    <p:spTree>
+      <p:nvGrpSpPr>
+        <p:cNvPr id="378" name="Shape 378"/>
+        <p:cNvGrpSpPr/>
+        <p:nvPr/>
+      </p:nvGrpSpPr>
+      <p:grpSpPr>
+        <a:xfrm>
+          <a:off x="0" y="0"/>
+          <a:ext cx="0" cy="0"/>
+          <a:chOff x="0" y="0"/>
+          <a:chExt cx="0" cy="0"/>
+        </a:xfrm>
+      </p:grpSpPr>
+      <p:sp>
+        <p:nvSpPr>
+          <p:cNvPr id="379" name="Google Shape;379;g129c47ed3ce_0_5:notes"/>
+          <p:cNvSpPr/>
+          <p:nvPr>
+            <p:ph idx="2" type="sldImg"/>
+          </p:nvPr>
+        </p:nvSpPr>
+        <p:spPr>
+          <a:xfrm>
+            <a:off x="381300" y="685800"/>
+            <a:ext cx="6096000" cy="3429000"/>
+          </a:xfrm>
+          <a:custGeom>
+            <a:rect b="b" l="l" r="r" t="t"/>
+            <a:pathLst>
+              <a:path extrusionOk="0" h="120000" w="120000">
+                <a:moveTo>
+                  <a:pt x="0" y="0"/>
+                </a:moveTo>
+                <a:lnTo>
+                  <a:pt x="120000" y="0"/>
+                </a:lnTo>
+                <a:lnTo>
+                  <a:pt x="120000" y="120000"/>
+                </a:lnTo>
+                <a:lnTo>
+                  <a:pt x="0" y="120000"/>
+                </a:lnTo>
+                <a:close/>
+              </a:path>
+            </a:pathLst>
+          </a:custGeom>
+        </p:spPr>
+      </p:sp>
+      <p:sp>
+        <p:nvSpPr>
+          <p:cNvPr id="380" name="Google Shape;380;g129c47ed3ce_0_5:notes"/>
           <p:cNvSpPr txBox="1"/>
           <p:nvPr>
             <p:ph idx="1" type="body"/>
@@ -16867,6 +17267,300 @@
         </p:nvSpPr>
         <p:spPr>
           <a:xfrm>
+            <a:off x="1303800" y="598575"/>
+            <a:ext cx="7030500" cy="999300"/>
+          </a:xfrm>
+          <a:prstGeom prst="rect">
+            <a:avLst/>
+          </a:prstGeom>
+        </p:spPr>
+        <p:txBody>
+          <a:bodyPr anchorCtr="0" anchor="t" bIns="91425" lIns="91425" spcFirstLastPara="1" rIns="91425" wrap="square" tIns="91425">
+            <a:normAutofit/>
+          </a:bodyPr>
+          <a:lstStyle/>
+          <a:p>
+            <a:pPr indent="0" lvl="0" marL="0" rtl="0" algn="l">
+              <a:spcBef>
+                <a:spcPts val="0"/>
+              </a:spcBef>
+              <a:spcAft>
+                <a:spcPts val="0"/>
+              </a:spcAft>
+              <a:buNone/>
+            </a:pPr>
+            <a:r>
+              <a:rPr lang="en"/>
+              <a:t>Looking for Null Values</a:t>
+            </a:r>
+            <a:endParaRPr/>
+          </a:p>
+        </p:txBody>
+      </p:sp>
+      <p:sp>
+        <p:nvSpPr>
+          <p:cNvPr id="340" name="Google Shape;340;p22"/>
+          <p:cNvSpPr txBox="1"/>
+          <p:nvPr>
+            <p:ph idx="1" type="body"/>
+          </p:nvPr>
+        </p:nvSpPr>
+        <p:spPr>
+          <a:xfrm>
+            <a:off x="674800" y="1945900"/>
+            <a:ext cx="2085300" cy="2541600"/>
+          </a:xfrm>
+          <a:prstGeom prst="rect">
+            <a:avLst/>
+          </a:prstGeom>
+        </p:spPr>
+        <p:txBody>
+          <a:bodyPr anchorCtr="0" anchor="t" bIns="91425" lIns="91425" spcFirstLastPara="1" rIns="91425" wrap="square" tIns="91425">
+            <a:normAutofit/>
+          </a:bodyPr>
+          <a:lstStyle/>
+          <a:p>
+            <a:pPr indent="0" lvl="0" marL="0" rtl="0" algn="l">
+              <a:spcBef>
+                <a:spcPts val="0"/>
+              </a:spcBef>
+              <a:spcAft>
+                <a:spcPts val="1200"/>
+              </a:spcAft>
+              <a:buNone/>
+            </a:pPr>
+            <a:r>
+              <a:rPr lang="en"/>
+              <a:t>Both the earnings and flows datasets have numerous rows that contain null values.</a:t>
+            </a:r>
+            <a:endParaRPr/>
+          </a:p>
+        </p:txBody>
+      </p:sp>
+      <p:pic>
+        <p:nvPicPr>
+          <p:cNvPr id="341" name="Google Shape;341;p22"/>
+          <p:cNvPicPr preferRelativeResize="0"/>
+          <p:nvPr/>
+        </p:nvPicPr>
+        <p:blipFill>
+          <a:blip r:embed="rId3">
+            <a:alphaModFix/>
+          </a:blip>
+          <a:stretch>
+            <a:fillRect/>
+          </a:stretch>
+        </p:blipFill>
+        <p:spPr>
+          <a:xfrm>
+            <a:off x="2809225" y="1750275"/>
+            <a:ext cx="2900425" cy="2737225"/>
+          </a:xfrm>
+          <a:prstGeom prst="rect">
+            <a:avLst/>
+          </a:prstGeom>
+          <a:noFill/>
+          <a:ln>
+            <a:noFill/>
+          </a:ln>
+        </p:spPr>
+      </p:pic>
+      <p:pic>
+        <p:nvPicPr>
+          <p:cNvPr id="342" name="Google Shape;342;p22"/>
+          <p:cNvPicPr preferRelativeResize="0"/>
+          <p:nvPr/>
+        </p:nvPicPr>
+        <p:blipFill>
+          <a:blip r:embed="rId4">
+            <a:alphaModFix/>
+          </a:blip>
+          <a:stretch>
+            <a:fillRect/>
+          </a:stretch>
+        </p:blipFill>
+        <p:spPr>
+          <a:xfrm>
+            <a:off x="5862050" y="1750275"/>
+            <a:ext cx="2900425" cy="2816551"/>
+          </a:xfrm>
+          <a:prstGeom prst="rect">
+            <a:avLst/>
+          </a:prstGeom>
+          <a:noFill/>
+          <a:ln>
+            <a:noFill/>
+          </a:ln>
+        </p:spPr>
+      </p:pic>
+    </p:spTree>
+  </p:cSld>
+  <p:clrMapOvr>
+    <a:masterClrMapping/>
+  </p:clrMapOvr>
+</p:sld>
+</file>
+
+<file path=ppt/slides/slide11.xml><?xml version="1.0" encoding="utf-8"?>
+<p:sld xmlns:a="http://schemas.openxmlformats.org/drawingml/2006/main" xmlns:r="http://schemas.openxmlformats.org/officeDocument/2006/relationships" xmlns:mc="http://schemas.openxmlformats.org/markup-compatibility/2006" xmlns:mv="urn:schemas-microsoft-com:mac:vml" xmlns:p="http://schemas.openxmlformats.org/presentationml/2006/main" xmlns:c="http://schemas.openxmlformats.org/drawingml/2006/chart" xmlns:dgm="http://schemas.openxmlformats.org/drawingml/2006/diagram" xmlns:o="urn:schemas-microsoft-com:office:office" xmlns:v="urn:schemas-microsoft-com:vml" xmlns:pvml="urn:schemas-microsoft-com:office:powerpoint" xmlns:com="http://schemas.openxmlformats.org/drawingml/2006/compatibility" xmlns:p14="http://schemas.microsoft.com/office/powerpoint/2010/main" xmlns:p15="http://schemas.microsoft.com/office/powerpoint/2012/main" xmlns:ahyp="http://schemas.microsoft.com/office/drawing/2018/hyperlinkcolor">
+  <p:cSld>
+    <p:spTree>
+      <p:nvGrpSpPr>
+        <p:cNvPr id="346" name="Shape 346"/>
+        <p:cNvGrpSpPr/>
+        <p:nvPr/>
+      </p:nvGrpSpPr>
+      <p:grpSpPr>
+        <a:xfrm>
+          <a:off x="0" y="0"/>
+          <a:ext cx="0" cy="0"/>
+          <a:chOff x="0" y="0"/>
+          <a:chExt cx="0" cy="0"/>
+        </a:xfrm>
+      </p:grpSpPr>
+      <p:sp>
+        <p:nvSpPr>
+          <p:cNvPr id="347" name="Google Shape;347;p23"/>
+          <p:cNvSpPr txBox="1"/>
+          <p:nvPr>
+            <p:ph type="title"/>
+          </p:nvPr>
+        </p:nvSpPr>
+        <p:spPr>
+          <a:xfrm>
+            <a:off x="1303800" y="598575"/>
+            <a:ext cx="3312000" cy="1590000"/>
+          </a:xfrm>
+          <a:prstGeom prst="rect">
+            <a:avLst/>
+          </a:prstGeom>
+        </p:spPr>
+        <p:txBody>
+          <a:bodyPr anchorCtr="0" anchor="t" bIns="91425" lIns="91425" spcFirstLastPara="1" rIns="91425" wrap="square" tIns="91425">
+            <a:normAutofit/>
+          </a:bodyPr>
+          <a:lstStyle/>
+          <a:p>
+            <a:pPr indent="0" lvl="0" marL="0" rtl="0" algn="l">
+              <a:spcBef>
+                <a:spcPts val="0"/>
+              </a:spcBef>
+              <a:spcAft>
+                <a:spcPts val="0"/>
+              </a:spcAft>
+              <a:buNone/>
+            </a:pPr>
+            <a:r>
+              <a:rPr lang="en"/>
+              <a:t>Checking Aggregation Levels</a:t>
+            </a:r>
+            <a:endParaRPr/>
+          </a:p>
+        </p:txBody>
+      </p:sp>
+      <p:sp>
+        <p:nvSpPr>
+          <p:cNvPr id="348" name="Google Shape;348;p23"/>
+          <p:cNvSpPr txBox="1"/>
+          <p:nvPr>
+            <p:ph idx="1" type="body"/>
+          </p:nvPr>
+        </p:nvSpPr>
+        <p:spPr>
+          <a:xfrm>
+            <a:off x="1303800" y="2309675"/>
+            <a:ext cx="3312000" cy="2221800"/>
+          </a:xfrm>
+          <a:prstGeom prst="rect">
+            <a:avLst/>
+          </a:prstGeom>
+        </p:spPr>
+        <p:txBody>
+          <a:bodyPr anchorCtr="0" anchor="t" bIns="91425" lIns="91425" spcFirstLastPara="1" rIns="91425" wrap="square" tIns="91425">
+            <a:normAutofit/>
+          </a:bodyPr>
+          <a:lstStyle/>
+          <a:p>
+            <a:pPr indent="0" lvl="0" marL="0" rtl="0" algn="l">
+              <a:spcBef>
+                <a:spcPts val="0"/>
+              </a:spcBef>
+              <a:spcAft>
+                <a:spcPts val="1200"/>
+              </a:spcAft>
+              <a:buNone/>
+            </a:pPr>
+            <a:r>
+              <a:rPr lang="en"/>
+              <a:t>Each record is associated with an aggregation level that signifies the level of detail</a:t>
+            </a:r>
+            <a:endParaRPr/>
+          </a:p>
+        </p:txBody>
+      </p:sp>
+      <p:pic>
+        <p:nvPicPr>
+          <p:cNvPr id="349" name="Google Shape;349;p23"/>
+          <p:cNvPicPr preferRelativeResize="0"/>
+          <p:nvPr/>
+        </p:nvPicPr>
+        <p:blipFill>
+          <a:blip r:embed="rId3">
+            <a:alphaModFix/>
+          </a:blip>
+          <a:stretch>
+            <a:fillRect/>
+          </a:stretch>
+        </p:blipFill>
+        <p:spPr>
+          <a:xfrm>
+            <a:off x="4758825" y="361738"/>
+            <a:ext cx="4223400" cy="4420036"/>
+          </a:xfrm>
+          <a:prstGeom prst="rect">
+            <a:avLst/>
+          </a:prstGeom>
+          <a:noFill/>
+          <a:ln>
+            <a:noFill/>
+          </a:ln>
+        </p:spPr>
+      </p:pic>
+    </p:spTree>
+  </p:cSld>
+  <p:clrMapOvr>
+    <a:masterClrMapping/>
+  </p:clrMapOvr>
+</p:sld>
+</file>
+
+<file path=ppt/slides/slide12.xml><?xml version="1.0" encoding="utf-8"?>
+<p:sld xmlns:a="http://schemas.openxmlformats.org/drawingml/2006/main" xmlns:r="http://schemas.openxmlformats.org/officeDocument/2006/relationships" xmlns:mc="http://schemas.openxmlformats.org/markup-compatibility/2006" xmlns:mv="urn:schemas-microsoft-com:mac:vml" xmlns:p="http://schemas.openxmlformats.org/presentationml/2006/main" xmlns:c="http://schemas.openxmlformats.org/drawingml/2006/chart" xmlns:dgm="http://schemas.openxmlformats.org/drawingml/2006/diagram" xmlns:o="urn:schemas-microsoft-com:office:office" xmlns:v="urn:schemas-microsoft-com:vml" xmlns:pvml="urn:schemas-microsoft-com:office:powerpoint" xmlns:com="http://schemas.openxmlformats.org/drawingml/2006/compatibility" xmlns:p14="http://schemas.microsoft.com/office/powerpoint/2010/main" xmlns:p15="http://schemas.microsoft.com/office/powerpoint/2012/main" xmlns:ahyp="http://schemas.microsoft.com/office/drawing/2018/hyperlinkcolor">
+  <p:cSld>
+    <p:spTree>
+      <p:nvGrpSpPr>
+        <p:cNvPr id="353" name="Shape 353"/>
+        <p:cNvGrpSpPr/>
+        <p:nvPr/>
+      </p:nvGrpSpPr>
+      <p:grpSpPr>
+        <a:xfrm>
+          <a:off x="0" y="0"/>
+          <a:ext cx="0" cy="0"/>
+          <a:chOff x="0" y="0"/>
+          <a:chExt cx="0" cy="0"/>
+        </a:xfrm>
+      </p:grpSpPr>
+      <p:sp>
+        <p:nvSpPr>
+          <p:cNvPr id="354" name="Google Shape;354;p24"/>
+          <p:cNvSpPr txBox="1"/>
+          <p:nvPr>
+            <p:ph type="title"/>
+          </p:nvPr>
+        </p:nvSpPr>
+        <p:spPr>
+          <a:xfrm>
             <a:off x="824000" y="1613825"/>
             <a:ext cx="5857800" cy="1872900"/>
           </a:xfrm>
@@ -16905,12 +17599,12 @@
 </p:sld>
 </file>
 
-<file path=ppt/slides/slide11.xml><?xml version="1.0" encoding="utf-8"?>
+<file path=ppt/slides/slide13.xml><?xml version="1.0" encoding="utf-8"?>
 <p:sld xmlns:a="http://schemas.openxmlformats.org/drawingml/2006/main" xmlns:r="http://schemas.openxmlformats.org/officeDocument/2006/relationships" xmlns:mc="http://schemas.openxmlformats.org/markup-compatibility/2006" xmlns:mv="urn:schemas-microsoft-com:mac:vml" xmlns:p="http://schemas.openxmlformats.org/presentationml/2006/main" xmlns:c="http://schemas.openxmlformats.org/drawingml/2006/chart" xmlns:dgm="http://schemas.openxmlformats.org/drawingml/2006/diagram" xmlns:o="urn:schemas-microsoft-com:office:office" xmlns:v="urn:schemas-microsoft-com:vml" xmlns:pvml="urn:schemas-microsoft-com:office:powerpoint" xmlns:com="http://schemas.openxmlformats.org/drawingml/2006/compatibility" xmlns:p14="http://schemas.microsoft.com/office/powerpoint/2010/main" xmlns:p15="http://schemas.microsoft.com/office/powerpoint/2012/main" xmlns:ahyp="http://schemas.microsoft.com/office/drawing/2018/hyperlinkcolor">
   <p:cSld>
     <p:spTree>
       <p:nvGrpSpPr>
-        <p:cNvPr id="343" name="Shape 343"/>
+        <p:cNvPr id="358" name="Shape 358"/>
         <p:cNvGrpSpPr/>
         <p:nvPr/>
       </p:nvGrpSpPr>
@@ -16924,7 +17618,7 @@
       </p:grpSpPr>
       <p:sp>
         <p:nvSpPr>
-          <p:cNvPr id="344" name="Google Shape;344;p23"/>
+          <p:cNvPr id="359" name="Google Shape;359;p25"/>
           <p:cNvSpPr txBox="1"/>
           <p:nvPr>
             <p:ph type="title"/>
@@ -16963,7 +17657,7 @@
       </p:sp>
       <p:sp>
         <p:nvSpPr>
-          <p:cNvPr id="345" name="Google Shape;345;p23"/>
+          <p:cNvPr id="360" name="Google Shape;360;p25"/>
           <p:cNvSpPr txBox="1"/>
           <p:nvPr>
             <p:ph idx="1" type="body"/>
@@ -17008,12 +17702,12 @@
 </p:sld>
 </file>
 
-<file path=ppt/slides/slide12.xml><?xml version="1.0" encoding="utf-8"?>
+<file path=ppt/slides/slide14.xml><?xml version="1.0" encoding="utf-8"?>
 <p:sld xmlns:a="http://schemas.openxmlformats.org/drawingml/2006/main" xmlns:r="http://schemas.openxmlformats.org/officeDocument/2006/relationships" xmlns:mc="http://schemas.openxmlformats.org/markup-compatibility/2006" xmlns:mv="urn:schemas-microsoft-com:mac:vml" xmlns:p="http://schemas.openxmlformats.org/presentationml/2006/main" xmlns:c="http://schemas.openxmlformats.org/drawingml/2006/chart" xmlns:dgm="http://schemas.openxmlformats.org/drawingml/2006/diagram" xmlns:o="urn:schemas-microsoft-com:office:office" xmlns:v="urn:schemas-microsoft-com:vml" xmlns:pvml="urn:schemas-microsoft-com:office:powerpoint" xmlns:com="http://schemas.openxmlformats.org/drawingml/2006/compatibility" xmlns:p14="http://schemas.microsoft.com/office/powerpoint/2010/main" xmlns:p15="http://schemas.microsoft.com/office/powerpoint/2012/main" xmlns:ahyp="http://schemas.microsoft.com/office/drawing/2018/hyperlinkcolor">
   <p:cSld>
     <p:spTree>
       <p:nvGrpSpPr>
-        <p:cNvPr id="349" name="Shape 349"/>
+        <p:cNvPr id="364" name="Shape 364"/>
         <p:cNvGrpSpPr/>
         <p:nvPr/>
       </p:nvGrpSpPr>
@@ -17027,7 +17721,7 @@
       </p:grpSpPr>
       <p:sp>
         <p:nvSpPr>
-          <p:cNvPr id="350" name="Google Shape;350;p24"/>
+          <p:cNvPr id="365" name="Google Shape;365;p26"/>
           <p:cNvSpPr txBox="1"/>
           <p:nvPr>
             <p:ph type="title"/>
@@ -17073,12 +17767,12 @@
 </p:sld>
 </file>
 
-<file path=ppt/slides/slide13.xml><?xml version="1.0" encoding="utf-8"?>
+<file path=ppt/slides/slide15.xml><?xml version="1.0" encoding="utf-8"?>
 <p:sld xmlns:a="http://schemas.openxmlformats.org/drawingml/2006/main" xmlns:r="http://schemas.openxmlformats.org/officeDocument/2006/relationships" xmlns:mc="http://schemas.openxmlformats.org/markup-compatibility/2006" xmlns:mv="urn:schemas-microsoft-com:mac:vml" xmlns:p="http://schemas.openxmlformats.org/presentationml/2006/main" xmlns:c="http://schemas.openxmlformats.org/drawingml/2006/chart" xmlns:dgm="http://schemas.openxmlformats.org/drawingml/2006/diagram" xmlns:o="urn:schemas-microsoft-com:office:office" xmlns:v="urn:schemas-microsoft-com:vml" xmlns:pvml="urn:schemas-microsoft-com:office:powerpoint" xmlns:com="http://schemas.openxmlformats.org/drawingml/2006/compatibility" xmlns:p14="http://schemas.microsoft.com/office/powerpoint/2010/main" xmlns:p15="http://schemas.microsoft.com/office/powerpoint/2012/main" xmlns:ahyp="http://schemas.microsoft.com/office/drawing/2018/hyperlinkcolor">
   <p:cSld>
     <p:spTree>
       <p:nvGrpSpPr>
-        <p:cNvPr id="354" name="Shape 354"/>
+        <p:cNvPr id="369" name="Shape 369"/>
         <p:cNvGrpSpPr/>
         <p:nvPr/>
       </p:nvGrpSpPr>
@@ -17092,7 +17786,7 @@
       </p:grpSpPr>
       <p:sp>
         <p:nvSpPr>
-          <p:cNvPr id="355" name="Google Shape;355;p25"/>
+          <p:cNvPr id="370" name="Google Shape;370;p27"/>
           <p:cNvSpPr txBox="1"/>
           <p:nvPr>
             <p:ph type="title"/>
@@ -17132,7 +17826,7 @@
       </p:sp>
       <p:sp>
         <p:nvSpPr>
-          <p:cNvPr id="356" name="Google Shape;356;p25"/>
+          <p:cNvPr id="371" name="Google Shape;371;p27"/>
           <p:cNvSpPr txBox="1"/>
           <p:nvPr/>
         </p:nvSpPr>
@@ -17185,6 +17879,251 @@
               <a:cs typeface="Nunito"/>
               <a:sym typeface="Nunito"/>
             </a:endParaRPr>
+          </a:p>
+        </p:txBody>
+      </p:sp>
+    </p:spTree>
+  </p:cSld>
+  <p:clrMapOvr>
+    <a:masterClrMapping/>
+  </p:clrMapOvr>
+</p:sld>
+</file>
+
+<file path=ppt/slides/slide16.xml><?xml version="1.0" encoding="utf-8"?>
+<p:sld xmlns:a="http://schemas.openxmlformats.org/drawingml/2006/main" xmlns:r="http://schemas.openxmlformats.org/officeDocument/2006/relationships" xmlns:mc="http://schemas.openxmlformats.org/markup-compatibility/2006" xmlns:mv="urn:schemas-microsoft-com:mac:vml" xmlns:p="http://schemas.openxmlformats.org/presentationml/2006/main" xmlns:c="http://schemas.openxmlformats.org/drawingml/2006/chart" xmlns:dgm="http://schemas.openxmlformats.org/drawingml/2006/diagram" xmlns:o="urn:schemas-microsoft-com:office:office" xmlns:v="urn:schemas-microsoft-com:vml" xmlns:pvml="urn:schemas-microsoft-com:office:powerpoint" xmlns:com="http://schemas.openxmlformats.org/drawingml/2006/compatibility" xmlns:p14="http://schemas.microsoft.com/office/powerpoint/2010/main" xmlns:p15="http://schemas.microsoft.com/office/powerpoint/2012/main" xmlns:ahyp="http://schemas.microsoft.com/office/drawing/2018/hyperlinkcolor">
+  <p:cSld>
+    <p:spTree>
+      <p:nvGrpSpPr>
+        <p:cNvPr id="375" name="Shape 375"/>
+        <p:cNvGrpSpPr/>
+        <p:nvPr/>
+      </p:nvGrpSpPr>
+      <p:grpSpPr>
+        <a:xfrm>
+          <a:off x="0" y="0"/>
+          <a:ext cx="0" cy="0"/>
+          <a:chOff x="0" y="0"/>
+          <a:chExt cx="0" cy="0"/>
+        </a:xfrm>
+      </p:grpSpPr>
+      <p:sp>
+        <p:nvSpPr>
+          <p:cNvPr id="376" name="Google Shape;376;p28"/>
+          <p:cNvSpPr txBox="1"/>
+          <p:nvPr>
+            <p:ph type="title"/>
+          </p:nvPr>
+        </p:nvSpPr>
+        <p:spPr>
+          <a:xfrm>
+            <a:off x="1303800" y="598575"/>
+            <a:ext cx="7030500" cy="999300"/>
+          </a:xfrm>
+          <a:prstGeom prst="rect">
+            <a:avLst/>
+          </a:prstGeom>
+        </p:spPr>
+        <p:txBody>
+          <a:bodyPr anchorCtr="0" anchor="t" bIns="91425" lIns="91425" spcFirstLastPara="1" rIns="91425" wrap="square" tIns="91425">
+            <a:normAutofit/>
+          </a:bodyPr>
+          <a:lstStyle/>
+          <a:p>
+            <a:pPr indent="0" lvl="0" marL="0" rtl="0" algn="l">
+              <a:spcBef>
+                <a:spcPts val="0"/>
+              </a:spcBef>
+              <a:spcAft>
+                <a:spcPts val="0"/>
+              </a:spcAft>
+              <a:buNone/>
+            </a:pPr>
+            <a:r>
+              <a:rPr lang="en"/>
+              <a:t>Interactive Elements</a:t>
+            </a:r>
+            <a:endParaRPr/>
+          </a:p>
+        </p:txBody>
+      </p:sp>
+      <p:sp>
+        <p:nvSpPr>
+          <p:cNvPr id="377" name="Google Shape;377;p28"/>
+          <p:cNvSpPr txBox="1"/>
+          <p:nvPr>
+            <p:ph idx="1" type="body"/>
+          </p:nvPr>
+        </p:nvSpPr>
+        <p:spPr>
+          <a:xfrm>
+            <a:off x="1303800" y="1990050"/>
+            <a:ext cx="7030500" cy="2541600"/>
+          </a:xfrm>
+          <a:prstGeom prst="rect">
+            <a:avLst/>
+          </a:prstGeom>
+        </p:spPr>
+        <p:txBody>
+          <a:bodyPr anchorCtr="0" anchor="t" bIns="91425" lIns="91425" spcFirstLastPara="1" rIns="91425" wrap="square" tIns="91425">
+            <a:normAutofit/>
+          </a:bodyPr>
+          <a:lstStyle/>
+          <a:p>
+            <a:pPr indent="-311150" lvl="0" marL="457200" rtl="0" algn="l">
+              <a:spcBef>
+                <a:spcPts val="0"/>
+              </a:spcBef>
+              <a:spcAft>
+                <a:spcPts val="0"/>
+              </a:spcAft>
+              <a:buSzPts val="1300"/>
+              <a:buChar char="❏"/>
+            </a:pPr>
+            <a:r>
+              <a:rPr lang="en"/>
+              <a:t>Searching and selecting a specific university</a:t>
+            </a:r>
+            <a:endParaRPr/>
+          </a:p>
+          <a:p>
+            <a:pPr indent="-311150" lvl="0" marL="457200" rtl="0" algn="l">
+              <a:spcBef>
+                <a:spcPts val="0"/>
+              </a:spcBef>
+              <a:spcAft>
+                <a:spcPts val="0"/>
+              </a:spcAft>
+              <a:buSzPts val="1300"/>
+              <a:buChar char="❏"/>
+            </a:pPr>
+            <a:r>
+              <a:rPr lang="en"/>
+              <a:t>Selecting state to see state outcomes and more details</a:t>
+            </a:r>
+            <a:endParaRPr/>
+          </a:p>
+          <a:p>
+            <a:pPr indent="-311150" lvl="0" marL="457200" rtl="0" algn="l">
+              <a:spcBef>
+                <a:spcPts val="0"/>
+              </a:spcBef>
+              <a:spcAft>
+                <a:spcPts val="0"/>
+              </a:spcAft>
+              <a:buSzPts val="1300"/>
+              <a:buChar char="❏"/>
+            </a:pPr>
+            <a:r>
+              <a:rPr lang="en"/>
+              <a:t>Filtering outcomes and seeing matching universities</a:t>
+            </a:r>
+            <a:endParaRPr/>
+          </a:p>
+        </p:txBody>
+      </p:sp>
+    </p:spTree>
+  </p:cSld>
+  <p:clrMapOvr>
+    <a:masterClrMapping/>
+  </p:clrMapOvr>
+</p:sld>
+</file>
+
+<file path=ppt/slides/slide17.xml><?xml version="1.0" encoding="utf-8"?>
+<p:sld xmlns:a="http://schemas.openxmlformats.org/drawingml/2006/main" xmlns:r="http://schemas.openxmlformats.org/officeDocument/2006/relationships" xmlns:mc="http://schemas.openxmlformats.org/markup-compatibility/2006" xmlns:mv="urn:schemas-microsoft-com:mac:vml" xmlns:p="http://schemas.openxmlformats.org/presentationml/2006/main" xmlns:c="http://schemas.openxmlformats.org/drawingml/2006/chart" xmlns:dgm="http://schemas.openxmlformats.org/drawingml/2006/diagram" xmlns:o="urn:schemas-microsoft-com:office:office" xmlns:v="urn:schemas-microsoft-com:vml" xmlns:pvml="urn:schemas-microsoft-com:office:powerpoint" xmlns:com="http://schemas.openxmlformats.org/drawingml/2006/compatibility" xmlns:p14="http://schemas.microsoft.com/office/powerpoint/2010/main" xmlns:p15="http://schemas.microsoft.com/office/powerpoint/2012/main" xmlns:ahyp="http://schemas.microsoft.com/office/drawing/2018/hyperlinkcolor">
+  <p:cSld>
+    <p:spTree>
+      <p:nvGrpSpPr>
+        <p:cNvPr id="381" name="Shape 381"/>
+        <p:cNvGrpSpPr/>
+        <p:nvPr/>
+      </p:nvGrpSpPr>
+      <p:grpSpPr>
+        <a:xfrm>
+          <a:off x="0" y="0"/>
+          <a:ext cx="0" cy="0"/>
+          <a:chOff x="0" y="0"/>
+          <a:chExt cx="0" cy="0"/>
+        </a:xfrm>
+      </p:grpSpPr>
+      <p:sp>
+        <p:nvSpPr>
+          <p:cNvPr id="382" name="Google Shape;382;p29"/>
+          <p:cNvSpPr txBox="1"/>
+          <p:nvPr>
+            <p:ph type="title"/>
+          </p:nvPr>
+        </p:nvSpPr>
+        <p:spPr>
+          <a:xfrm>
+            <a:off x="1303800" y="598575"/>
+            <a:ext cx="7030500" cy="999300"/>
+          </a:xfrm>
+          <a:prstGeom prst="rect">
+            <a:avLst/>
+          </a:prstGeom>
+        </p:spPr>
+        <p:txBody>
+          <a:bodyPr anchorCtr="0" anchor="t" bIns="91425" lIns="91425" spcFirstLastPara="1" rIns="91425" wrap="square" tIns="91425">
+            <a:normAutofit/>
+          </a:bodyPr>
+          <a:lstStyle/>
+          <a:p>
+            <a:pPr indent="0" lvl="0" marL="0" rtl="0" algn="l">
+              <a:spcBef>
+                <a:spcPts val="0"/>
+              </a:spcBef>
+              <a:spcAft>
+                <a:spcPts val="0"/>
+              </a:spcAft>
+              <a:buNone/>
+            </a:pPr>
+            <a:r>
+              <a:rPr lang="en"/>
+              <a:t>What we used</a:t>
+            </a:r>
+            <a:endParaRPr/>
+          </a:p>
+        </p:txBody>
+      </p:sp>
+      <p:sp>
+        <p:nvSpPr>
+          <p:cNvPr id="383" name="Google Shape;383;p29"/>
+          <p:cNvSpPr txBox="1"/>
+          <p:nvPr>
+            <p:ph idx="1" type="body"/>
+          </p:nvPr>
+        </p:nvSpPr>
+        <p:spPr>
+          <a:xfrm>
+            <a:off x="1303800" y="1990050"/>
+            <a:ext cx="7030500" cy="2541600"/>
+          </a:xfrm>
+          <a:prstGeom prst="rect">
+            <a:avLst/>
+          </a:prstGeom>
+        </p:spPr>
+        <p:txBody>
+          <a:bodyPr anchorCtr="0" anchor="t" bIns="91425" lIns="91425" spcFirstLastPara="1" rIns="91425" wrap="square" tIns="91425">
+            <a:normAutofit/>
+          </a:bodyPr>
+          <a:lstStyle/>
+          <a:p>
+            <a:pPr indent="0" lvl="0" marL="0" rtl="0" algn="l">
+              <a:spcBef>
+                <a:spcPts val="0"/>
+              </a:spcBef>
+              <a:spcAft>
+                <a:spcPts val="1200"/>
+              </a:spcAft>
+              <a:buNone/>
+            </a:pPr>
+            <a:r>
+              <a:rPr lang="en"/>
+              <a:t>The dashboard is going to be created using Tableau.</a:t>
+            </a:r>
+            <a:endParaRPr/>
           </a:p>
         </p:txBody>
       </p:sp>
@@ -17914,7 +18853,7 @@
         </p:spPr>
         <p:txBody>
           <a:bodyPr anchorCtr="0" anchor="t" bIns="91425" lIns="91425" spcFirstLastPara="1" rIns="91425" wrap="square" tIns="91425">
-            <a:normAutofit/>
+            <a:normAutofit fontScale="90000"/>
           </a:bodyPr>
           <a:lstStyle/>
           <a:p>
@@ -17928,7 +18867,8 @@
               <a:buNone/>
             </a:pPr>
             <a:r>
-              <a:t/>
+              <a:rPr lang="en"/>
+              <a:t>Finding out what each column represents</a:t>
             </a:r>
             <a:endParaRPr/>
           </a:p>
@@ -17967,7 +18907,35 @@
               <a:buNone/>
             </a:pPr>
             <a:r>
-              <a:t/>
+              <a:rPr lang="en"/>
+              <a:t>The names of many columns are vague or unclear. To find out what they stand for we referenced the </a:t>
+            </a:r>
+            <a:r>
+              <a:rPr lang="en" u="sng">
+                <a:solidFill>
+                  <a:schemeClr val="lt2"/>
+                </a:solidFill>
+                <a:hlinkClick r:id="rId3">
+                  <a:extLst>
+                    <a:ext uri="{A12FA001-AC4F-418D-AE19-62706E023703}">
+                      <ahyp:hlinkClr val="tx"/>
+                    </a:ext>
+                  </a:extLst>
+                </a:hlinkClick>
+              </a:rPr>
+              <a:t>LEHD Public Use Data Schema</a:t>
+            </a:r>
+            <a:r>
+              <a:rPr lang="en">
+                <a:solidFill>
+                  <a:schemeClr val="lt2"/>
+                </a:solidFill>
+              </a:rPr>
+              <a:t>.</a:t>
+            </a:r>
+            <a:r>
+              <a:rPr lang="en"/>
+              <a:t> </a:t>
             </a:r>
             <a:endParaRPr/>
           </a:p>
@@ -17982,6 +18950,285 @@
 </file>
 
 <file path=ppt/theme/theme1.xml><?xml version="1.0" encoding="utf-8"?>
+<a:theme xmlns:a="http://schemas.openxmlformats.org/drawingml/2006/main" xmlns:r="http://schemas.openxmlformats.org/officeDocument/2006/relationships">
+  <a:themeElements>
+    <a:clrScheme name="Default">
+      <a:dk1>
+        <a:srgbClr val="000000"/>
+      </a:dk1>
+      <a:lt1>
+        <a:srgbClr val="FFFFFF"/>
+      </a:lt1>
+      <a:dk2>
+        <a:srgbClr val="158158"/>
+      </a:dk2>
+      <a:lt2>
+        <a:srgbClr val="F3F3F3"/>
+      </a:lt2>
+      <a:accent1>
+        <a:srgbClr val="058DC7"/>
+      </a:accent1>
+      <a:accent2>
+        <a:srgbClr val="50B432"/>
+      </a:accent2>
+      <a:accent3>
+        <a:srgbClr val="ED561B"/>
+      </a:accent3>
+      <a:accent4>
+        <a:srgbClr val="EDEF00"/>
+      </a:accent4>
+      <a:accent5>
+        <a:srgbClr val="24CBE5"/>
+      </a:accent5>
+      <a:accent6>
+        <a:srgbClr val="64E572"/>
+      </a:accent6>
+      <a:hlink>
+        <a:srgbClr val="2200CC"/>
+      </a:hlink>
+      <a:folHlink>
+        <a:srgbClr val="551A8B"/>
+      </a:folHlink>
+    </a:clrScheme>
+    <a:fontScheme name="Office">
+      <a:majorFont>
+        <a:latin typeface="Arial"/>
+        <a:ea typeface=""/>
+        <a:cs typeface=""/>
+        <a:font script="Jpan" typeface="ＭＳ Ｐゴシック"/>
+        <a:font script="Hang" typeface="맑은 고딕"/>
+        <a:font script="Hans" typeface="宋体"/>
+        <a:font script="Hant" typeface="新細明體"/>
+        <a:font script="Arab" typeface="Times New Roman"/>
+        <a:font script="Hebr" typeface="Times New Roman"/>
+        <a:font script="Thai" typeface="Angsana New"/>
+        <a:font script="Ethi" typeface="Nyala"/>
+        <a:font script="Beng" typeface="Vrinda"/>
+        <a:font script="Gujr" typeface="Shruti"/>
+        <a:font script="Khmr" typeface="MoolBoran"/>
+        <a:font script="Knda" typeface="Tunga"/>
+        <a:font script="Guru" typeface="Raavi"/>
+        <a:font script="Cans" typeface="Euphemia"/>
+        <a:font script="Cher" typeface="Plantagenet Cherokee"/>
+        <a:font script="Yiii" typeface="Microsoft Yi Baiti"/>
+        <a:font script="Tibt" typeface="Microsoft Himalaya"/>
+        <a:font script="Thaa" typeface="MV Boli"/>
+        <a:font script="Deva" typeface="Mangal"/>
+        <a:font script="Telu" typeface="Gautami"/>
+        <a:font script="Taml" typeface="Latha"/>
+        <a:font script="Syrc" typeface="Estrangelo Edessa"/>
+        <a:font script="Orya" typeface="Kalinga"/>
+        <a:font script="Mlym" typeface="Kartika"/>
+        <a:font script="Laoo" typeface="DokChampa"/>
+        <a:font script="Sinh" typeface="Iskoola Pota"/>
+        <a:font script="Mong" typeface="Mongolian Baiti"/>
+        <a:font script="Viet" typeface="Times New Roman"/>
+        <a:font script="Uigh" typeface="Microsoft Uighur"/>
+        <a:font script="Geor" typeface="Sylfaen"/>
+      </a:majorFont>
+      <a:minorFont>
+        <a:latin typeface="Arial"/>
+        <a:ea typeface=""/>
+        <a:cs typeface=""/>
+        <a:font script="Jpan" typeface="ＭＳ Ｐゴシック"/>
+        <a:font script="Hang" typeface="맑은 고딕"/>
+        <a:font script="Hans" typeface="宋体"/>
+        <a:font script="Hant" typeface="新細明體"/>
+        <a:font script="Arab" typeface="Arial"/>
+        <a:font script="Hebr" typeface="Arial"/>
+        <a:font script="Thai" typeface="Cordia New"/>
+        <a:font script="Ethi" typeface="Nyala"/>
+        <a:font script="Beng" typeface="Vrinda"/>
+        <a:font script="Gujr" typeface="Shruti"/>
+        <a:font script="Khmr" typeface="DaunPenh"/>
+        <a:font script="Knda" typeface="Tunga"/>
+        <a:font script="Guru" typeface="Raavi"/>
+        <a:font script="Cans" typeface="Euphemia"/>
+        <a:font script="Cher" typeface="Plantagenet Cherokee"/>
+        <a:font script="Yiii" typeface="Microsoft Yi Baiti"/>
+        <a:font script="Tibt" typeface="Microsoft Himalaya"/>
+        <a:font script="Thaa" typeface="MV Boli"/>
+        <a:font script="Deva" typeface="Mangal"/>
+        <a:font script="Telu" typeface="Gautami"/>
+        <a:font script="Taml" typeface="Latha"/>
+        <a:font script="Syrc" typeface="Estrangelo Edessa"/>
+        <a:font script="Orya" typeface="Kalinga"/>
+        <a:font script="Mlym" typeface="Kartika"/>
+        <a:font script="Laoo" typeface="DokChampa"/>
+        <a:font script="Sinh" typeface="Iskoola Pota"/>
+        <a:font script="Mong" typeface="Mongolian Baiti"/>
+        <a:font script="Viet" typeface="Arial"/>
+        <a:font script="Uigh" typeface="Microsoft Uighur"/>
+        <a:font script="Geor" typeface="Sylfaen"/>
+      </a:minorFont>
+    </a:fontScheme>
+    <a:fmtScheme name="Office">
+      <a:fillStyleLst>
+        <a:solidFill>
+          <a:schemeClr val="phClr"/>
+        </a:solidFill>
+        <a:gradFill rotWithShape="1">
+          <a:gsLst>
+            <a:gs pos="0">
+              <a:schemeClr val="phClr">
+                <a:tint val="50000"/>
+                <a:satMod val="300000"/>
+              </a:schemeClr>
+            </a:gs>
+            <a:gs pos="35000">
+              <a:schemeClr val="phClr">
+                <a:tint val="37000"/>
+                <a:satMod val="300000"/>
+              </a:schemeClr>
+            </a:gs>
+            <a:gs pos="100000">
+              <a:schemeClr val="phClr">
+                <a:tint val="15000"/>
+                <a:satMod val="350000"/>
+              </a:schemeClr>
+            </a:gs>
+          </a:gsLst>
+          <a:lin ang="16200000" scaled="1"/>
+        </a:gradFill>
+        <a:gradFill rotWithShape="1">
+          <a:gsLst>
+            <a:gs pos="0">
+              <a:schemeClr val="phClr">
+                <a:tint val="100000"/>
+                <a:shade val="100000"/>
+                <a:satMod val="130000"/>
+              </a:schemeClr>
+            </a:gs>
+            <a:gs pos="100000">
+              <a:schemeClr val="phClr">
+                <a:tint val="50000"/>
+                <a:shade val="100000"/>
+                <a:satMod val="350000"/>
+              </a:schemeClr>
+            </a:gs>
+          </a:gsLst>
+          <a:lin ang="16200000" scaled="0"/>
+        </a:gradFill>
+      </a:fillStyleLst>
+      <a:lnStyleLst>
+        <a:ln w="9525" cap="flat" cmpd="sng" algn="ctr">
+          <a:solidFill>
+            <a:schemeClr val="phClr">
+              <a:shade val="95000"/>
+              <a:satMod val="105000"/>
+            </a:schemeClr>
+          </a:solidFill>
+          <a:prstDash val="solid"/>
+        </a:ln>
+        <a:ln w="25400" cap="flat" cmpd="sng" algn="ctr">
+          <a:solidFill>
+            <a:schemeClr val="phClr"/>
+          </a:solidFill>
+          <a:prstDash val="solid"/>
+        </a:ln>
+        <a:ln w="38100" cap="flat" cmpd="sng" algn="ctr">
+          <a:solidFill>
+            <a:schemeClr val="phClr"/>
+          </a:solidFill>
+          <a:prstDash val="solid"/>
+        </a:ln>
+      </a:lnStyleLst>
+      <a:effectStyleLst>
+        <a:effectStyle>
+          <a:effectLst>
+            <a:outerShdw blurRad="40000" dist="20000" dir="5400000" rotWithShape="0">
+              <a:srgbClr val="000000">
+                <a:alpha val="38000"/>
+              </a:srgbClr>
+            </a:outerShdw>
+          </a:effectLst>
+        </a:effectStyle>
+        <a:effectStyle>
+          <a:effectLst>
+            <a:outerShdw blurRad="40000" dist="23000" dir="5400000" rotWithShape="0">
+              <a:srgbClr val="000000">
+                <a:alpha val="35000"/>
+              </a:srgbClr>
+            </a:outerShdw>
+          </a:effectLst>
+        </a:effectStyle>
+        <a:effectStyle>
+          <a:effectLst>
+            <a:outerShdw blurRad="40000" dist="23000" dir="5400000" rotWithShape="0">
+              <a:srgbClr val="000000">
+                <a:alpha val="35000"/>
+              </a:srgbClr>
+            </a:outerShdw>
+          </a:effectLst>
+          <a:scene3d>
+            <a:camera prst="orthographicFront">
+              <a:rot lat="0" lon="0" rev="0"/>
+            </a:camera>
+            <a:lightRig rig="threePt" dir="t">
+              <a:rot lat="0" lon="0" rev="1200000"/>
+            </a:lightRig>
+          </a:scene3d>
+          <a:sp3d>
+            <a:bevelT w="63500" h="25400"/>
+          </a:sp3d>
+        </a:effectStyle>
+      </a:effectStyleLst>
+      <a:bgFillStyleLst>
+        <a:solidFill>
+          <a:schemeClr val="phClr"/>
+        </a:solidFill>
+        <a:gradFill rotWithShape="1">
+          <a:gsLst>
+            <a:gs pos="0">
+              <a:schemeClr val="phClr">
+                <a:tint val="40000"/>
+                <a:satMod val="350000"/>
+              </a:schemeClr>
+            </a:gs>
+            <a:gs pos="40000">
+              <a:schemeClr val="phClr">
+                <a:tint val="45000"/>
+                <a:shade val="99000"/>
+                <a:satMod val="350000"/>
+              </a:schemeClr>
+            </a:gs>
+            <a:gs pos="100000">
+              <a:schemeClr val="phClr">
+                <a:shade val="20000"/>
+                <a:satMod val="255000"/>
+              </a:schemeClr>
+            </a:gs>
+          </a:gsLst>
+          <a:path path="circle">
+            <a:fillToRect l="50000" t="-80000" r="50000" b="180000"/>
+          </a:path>
+        </a:gradFill>
+        <a:gradFill rotWithShape="1">
+          <a:gsLst>
+            <a:gs pos="0">
+              <a:schemeClr val="phClr">
+                <a:tint val="80000"/>
+                <a:satMod val="300000"/>
+              </a:schemeClr>
+            </a:gs>
+            <a:gs pos="100000">
+              <a:schemeClr val="phClr">
+                <a:shade val="30000"/>
+                <a:satMod val="200000"/>
+              </a:schemeClr>
+            </a:gs>
+          </a:gsLst>
+          <a:path path="circle">
+            <a:fillToRect l="50000" t="50000" r="50000" b="50000"/>
+          </a:path>
+        </a:gradFill>
+      </a:bgFillStyleLst>
+    </a:fmtScheme>
+  </a:themeElements>
+</a:theme>
+</file>
+
+<file path=ppt/theme/theme2.xml><?xml version="1.0" encoding="utf-8"?>
 <a:theme xmlns:a="http://schemas.openxmlformats.org/drawingml/2006/main" xmlns:r="http://schemas.openxmlformats.org/officeDocument/2006/relationships" name="Inertia">
   <a:themeElements>
     <a:clrScheme name="Momentum">
@@ -18258,283 +19505,4 @@
     </a:fmtScheme>
   </a:themeElements>
 </a:theme>
-</file>
-
-<file path=ppt/theme/theme2.xml><?xml version="1.0" encoding="utf-8"?>
-<a:theme xmlns:a="http://schemas.openxmlformats.org/drawingml/2006/main" xmlns:r="http://schemas.openxmlformats.org/officeDocument/2006/relationships">
-  <a:themeElements>
-    <a:clrScheme name="Default">
-      <a:dk1>
-        <a:srgbClr val="000000"/>
-      </a:dk1>
-      <a:lt1>
-        <a:srgbClr val="FFFFFF"/>
-      </a:lt1>
-      <a:dk2>
-        <a:srgbClr val="158158"/>
-      </a:dk2>
-      <a:lt2>
-        <a:srgbClr val="F3F3F3"/>
-      </a:lt2>
-      <a:accent1>
-        <a:srgbClr val="058DC7"/>
-      </a:accent1>
-      <a:accent2>
-        <a:srgbClr val="50B432"/>
-      </a:accent2>
-      <a:accent3>
-        <a:srgbClr val="ED561B"/>
-      </a:accent3>
-      <a:accent4>
-        <a:srgbClr val="EDEF00"/>
-      </a:accent4>
-      <a:accent5>
-        <a:srgbClr val="24CBE5"/>
-      </a:accent5>
-      <a:accent6>
-        <a:srgbClr val="64E572"/>
-      </a:accent6>
-      <a:hlink>
-        <a:srgbClr val="2200CC"/>
-      </a:hlink>
-      <a:folHlink>
-        <a:srgbClr val="551A8B"/>
-      </a:folHlink>
-    </a:clrScheme>
-    <a:fontScheme name="Office">
-      <a:majorFont>
-        <a:latin typeface="Arial"/>
-        <a:ea typeface=""/>
-        <a:cs typeface=""/>
-        <a:font script="Jpan" typeface="ＭＳ Ｐゴシック"/>
-        <a:font script="Hang" typeface="맑은 고딕"/>
-        <a:font script="Hans" typeface="宋体"/>
-        <a:font script="Hant" typeface="新細明體"/>
-        <a:font script="Arab" typeface="Times New Roman"/>
-        <a:font script="Hebr" typeface="Times New Roman"/>
-        <a:font script="Thai" typeface="Angsana New"/>
-        <a:font script="Ethi" typeface="Nyala"/>
-        <a:font script="Beng" typeface="Vrinda"/>
-        <a:font script="Gujr" typeface="Shruti"/>
-        <a:font script="Khmr" typeface="MoolBoran"/>
-        <a:font script="Knda" typeface="Tunga"/>
-        <a:font script="Guru" typeface="Raavi"/>
-        <a:font script="Cans" typeface="Euphemia"/>
-        <a:font script="Cher" typeface="Plantagenet Cherokee"/>
-        <a:font script="Yiii" typeface="Microsoft Yi Baiti"/>
-        <a:font script="Tibt" typeface="Microsoft Himalaya"/>
-        <a:font script="Thaa" typeface="MV Boli"/>
-        <a:font script="Deva" typeface="Mangal"/>
-        <a:font script="Telu" typeface="Gautami"/>
-        <a:font script="Taml" typeface="Latha"/>
-        <a:font script="Syrc" typeface="Estrangelo Edessa"/>
-        <a:font script="Orya" typeface="Kalinga"/>
-        <a:font script="Mlym" typeface="Kartika"/>
-        <a:font script="Laoo" typeface="DokChampa"/>
-        <a:font script="Sinh" typeface="Iskoola Pota"/>
-        <a:font script="Mong" typeface="Mongolian Baiti"/>
-        <a:font script="Viet" typeface="Times New Roman"/>
-        <a:font script="Uigh" typeface="Microsoft Uighur"/>
-        <a:font script="Geor" typeface="Sylfaen"/>
-      </a:majorFont>
-      <a:minorFont>
-        <a:latin typeface="Arial"/>
-        <a:ea typeface=""/>
-        <a:cs typeface=""/>
-        <a:font script="Jpan" typeface="ＭＳ Ｐゴシック"/>
-        <a:font script="Hang" typeface="맑은 고딕"/>
-        <a:font script="Hans" typeface="宋体"/>
-        <a:font script="Hant" typeface="新細明體"/>
-        <a:font script="Arab" typeface="Arial"/>
-        <a:font script="Hebr" typeface="Arial"/>
-        <a:font script="Thai" typeface="Cordia New"/>
-        <a:font script="Ethi" typeface="Nyala"/>
-        <a:font script="Beng" typeface="Vrinda"/>
-        <a:font script="Gujr" typeface="Shruti"/>
-        <a:font script="Khmr" typeface="DaunPenh"/>
-        <a:font script="Knda" typeface="Tunga"/>
-        <a:font script="Guru" typeface="Raavi"/>
-        <a:font script="Cans" typeface="Euphemia"/>
-        <a:font script="Cher" typeface="Plantagenet Cherokee"/>
-        <a:font script="Yiii" typeface="Microsoft Yi Baiti"/>
-        <a:font script="Tibt" typeface="Microsoft Himalaya"/>
-        <a:font script="Thaa" typeface="MV Boli"/>
-        <a:font script="Deva" typeface="Mangal"/>
-        <a:font script="Telu" typeface="Gautami"/>
-        <a:font script="Taml" typeface="Latha"/>
-        <a:font script="Syrc" typeface="Estrangelo Edessa"/>
-        <a:font script="Orya" typeface="Kalinga"/>
-        <a:font script="Mlym" typeface="Kartika"/>
-        <a:font script="Laoo" typeface="DokChampa"/>
-        <a:font script="Sinh" typeface="Iskoola Pota"/>
-        <a:font script="Mong" typeface="Mongolian Baiti"/>
-        <a:font script="Viet" typeface="Arial"/>
-        <a:font script="Uigh" typeface="Microsoft Uighur"/>
-        <a:font script="Geor" typeface="Sylfaen"/>
-      </a:minorFont>
-    </a:fontScheme>
-    <a:fmtScheme name="Office">
-      <a:fillStyleLst>
-        <a:solidFill>
-          <a:schemeClr val="phClr"/>
-        </a:solidFill>
-        <a:gradFill rotWithShape="1">
-          <a:gsLst>
-            <a:gs pos="0">
-              <a:schemeClr val="phClr">
-                <a:tint val="50000"/>
-                <a:satMod val="300000"/>
-              </a:schemeClr>
-            </a:gs>
-            <a:gs pos="35000">
-              <a:schemeClr val="phClr">
-                <a:tint val="37000"/>
-                <a:satMod val="300000"/>
-              </a:schemeClr>
-            </a:gs>
-            <a:gs pos="100000">
-              <a:schemeClr val="phClr">
-                <a:tint val="15000"/>
-                <a:satMod val="350000"/>
-              </a:schemeClr>
-            </a:gs>
-          </a:gsLst>
-          <a:lin ang="16200000" scaled="1"/>
-        </a:gradFill>
-        <a:gradFill rotWithShape="1">
-          <a:gsLst>
-            <a:gs pos="0">
-              <a:schemeClr val="phClr">
-                <a:tint val="100000"/>
-                <a:shade val="100000"/>
-                <a:satMod val="130000"/>
-              </a:schemeClr>
-            </a:gs>
-            <a:gs pos="100000">
-              <a:schemeClr val="phClr">
-                <a:tint val="50000"/>
-                <a:shade val="100000"/>
-                <a:satMod val="350000"/>
-              </a:schemeClr>
-            </a:gs>
-          </a:gsLst>
-          <a:lin ang="16200000" scaled="0"/>
-        </a:gradFill>
-      </a:fillStyleLst>
-      <a:lnStyleLst>
-        <a:ln w="9525" cap="flat" cmpd="sng" algn="ctr">
-          <a:solidFill>
-            <a:schemeClr val="phClr">
-              <a:shade val="95000"/>
-              <a:satMod val="105000"/>
-            </a:schemeClr>
-          </a:solidFill>
-          <a:prstDash val="solid"/>
-        </a:ln>
-        <a:ln w="25400" cap="flat" cmpd="sng" algn="ctr">
-          <a:solidFill>
-            <a:schemeClr val="phClr"/>
-          </a:solidFill>
-          <a:prstDash val="solid"/>
-        </a:ln>
-        <a:ln w="38100" cap="flat" cmpd="sng" algn="ctr">
-          <a:solidFill>
-            <a:schemeClr val="phClr"/>
-          </a:solidFill>
-          <a:prstDash val="solid"/>
-        </a:ln>
-      </a:lnStyleLst>
-      <a:effectStyleLst>
-        <a:effectStyle>
-          <a:effectLst>
-            <a:outerShdw blurRad="40000" dist="20000" dir="5400000" rotWithShape="0">
-              <a:srgbClr val="000000">
-                <a:alpha val="38000"/>
-              </a:srgbClr>
-            </a:outerShdw>
-          </a:effectLst>
-        </a:effectStyle>
-        <a:effectStyle>
-          <a:effectLst>
-            <a:outerShdw blurRad="40000" dist="23000" dir="5400000" rotWithShape="0">
-              <a:srgbClr val="000000">
-                <a:alpha val="35000"/>
-              </a:srgbClr>
-            </a:outerShdw>
-          </a:effectLst>
-        </a:effectStyle>
-        <a:effectStyle>
-          <a:effectLst>
-            <a:outerShdw blurRad="40000" dist="23000" dir="5400000" rotWithShape="0">
-              <a:srgbClr val="000000">
-                <a:alpha val="35000"/>
-              </a:srgbClr>
-            </a:outerShdw>
-          </a:effectLst>
-          <a:scene3d>
-            <a:camera prst="orthographicFront">
-              <a:rot lat="0" lon="0" rev="0"/>
-            </a:camera>
-            <a:lightRig rig="threePt" dir="t">
-              <a:rot lat="0" lon="0" rev="1200000"/>
-            </a:lightRig>
-          </a:scene3d>
-          <a:sp3d>
-            <a:bevelT w="63500" h="25400"/>
-          </a:sp3d>
-        </a:effectStyle>
-      </a:effectStyleLst>
-      <a:bgFillStyleLst>
-        <a:solidFill>
-          <a:schemeClr val="phClr"/>
-        </a:solidFill>
-        <a:gradFill rotWithShape="1">
-          <a:gsLst>
-            <a:gs pos="0">
-              <a:schemeClr val="phClr">
-                <a:tint val="40000"/>
-                <a:satMod val="350000"/>
-              </a:schemeClr>
-            </a:gs>
-            <a:gs pos="40000">
-              <a:schemeClr val="phClr">
-                <a:tint val="45000"/>
-                <a:shade val="99000"/>
-                <a:satMod val="350000"/>
-              </a:schemeClr>
-            </a:gs>
-            <a:gs pos="100000">
-              <a:schemeClr val="phClr">
-                <a:shade val="20000"/>
-                <a:satMod val="255000"/>
-              </a:schemeClr>
-            </a:gs>
-          </a:gsLst>
-          <a:path path="circle">
-            <a:fillToRect l="50000" t="-80000" r="50000" b="180000"/>
-          </a:path>
-        </a:gradFill>
-        <a:gradFill rotWithShape="1">
-          <a:gsLst>
-            <a:gs pos="0">
-              <a:schemeClr val="phClr">
-                <a:tint val="80000"/>
-                <a:satMod val="300000"/>
-              </a:schemeClr>
-            </a:gs>
-            <a:gs pos="100000">
-              <a:schemeClr val="phClr">
-                <a:shade val="30000"/>
-                <a:satMod val="200000"/>
-              </a:schemeClr>
-            </a:gs>
-          </a:gsLst>
-          <a:path path="circle">
-            <a:fillToRect l="50000" t="50000" r="50000" b="50000"/>
-          </a:path>
-        </a:gradFill>
-      </a:bgFillStyleLst>
-    </a:fmtScheme>
-  </a:themeElements>
-</a:theme>
 </file>
</xml_diff>

<commit_message>
Completed analysis slides draft
</commit_message>
<xml_diff>
--- a/media/Final Project - Employment Prosepects.pptx
+++ b/media/Final Project - Employment Prosepects.pptx
@@ -25,26 +25,27 @@
     <p:sldId id="270" r:id="rId20"/>
     <p:sldId id="271" r:id="rId21"/>
     <p:sldId id="272" r:id="rId22"/>
+    <p:sldId id="273" r:id="rId23"/>
   </p:sldIdLst>
   <p:sldSz cy="5143500" cx="9144000"/>
   <p:notesSz cx="6858000" cy="9144000"/>
   <p:embeddedFontLst>
     <p:embeddedFont>
       <p:font typeface="Nunito"/>
-      <p:regular r:id="rId23"/>
-      <p:bold r:id="rId24"/>
-      <p:italic r:id="rId25"/>
-      <p:boldItalic r:id="rId26"/>
+      <p:regular r:id="rId24"/>
+      <p:bold r:id="rId25"/>
+      <p:italic r:id="rId26"/>
+      <p:boldItalic r:id="rId27"/>
     </p:embeddedFont>
     <p:embeddedFont>
       <p:font typeface="Maven Pro"/>
-      <p:regular r:id="rId27"/>
-      <p:bold r:id="rId28"/>
+      <p:regular r:id="rId28"/>
+      <p:bold r:id="rId29"/>
     </p:embeddedFont>
     <p:embeddedFont>
       <p:font typeface="Comfortaa"/>
-      <p:regular r:id="rId29"/>
-      <p:bold r:id="rId30"/>
+      <p:regular r:id="rId30"/>
+      <p:bold r:id="rId31"/>
     </p:embeddedFont>
   </p:embeddedFontLst>
   <p:defaultTextStyle>
@@ -1221,7 +1222,7 @@
   <p:cSld>
     <p:spTree>
       <p:nvGrpSpPr>
-        <p:cNvPr id="361" name="Shape 361"/>
+        <p:cNvPr id="362" name="Shape 362"/>
         <p:cNvGrpSpPr/>
         <p:nvPr/>
       </p:nvGrpSpPr>
@@ -1235,7 +1236,7 @@
       </p:grpSpPr>
       <p:sp>
         <p:nvSpPr>
-          <p:cNvPr id="362" name="Google Shape;362;g129b6330eb3_0_366:notes"/>
+          <p:cNvPr id="363" name="Google Shape;363;g129c47ed3ce_0_24:notes"/>
           <p:cNvSpPr/>
           <p:nvPr>
             <p:ph idx="2" type="sldImg"/>
@@ -1270,7 +1271,7 @@
       </p:sp>
       <p:sp>
         <p:nvSpPr>
-          <p:cNvPr id="363" name="Google Shape;363;g129b6330eb3_0_366:notes"/>
+          <p:cNvPr id="364" name="Google Shape;364;g129c47ed3ce_0_24:notes"/>
           <p:cNvSpPr txBox="1"/>
           <p:nvPr>
             <p:ph idx="1" type="body"/>
@@ -1320,7 +1321,7 @@
   <p:cSld>
     <p:spTree>
       <p:nvGrpSpPr>
-        <p:cNvPr id="366" name="Shape 366"/>
+        <p:cNvPr id="368" name="Shape 368"/>
         <p:cNvGrpSpPr/>
         <p:nvPr/>
       </p:nvGrpSpPr>
@@ -1334,7 +1335,7 @@
       </p:grpSpPr>
       <p:sp>
         <p:nvSpPr>
-          <p:cNvPr id="367" name="Google Shape;367;g129b6330eb3_0_370:notes"/>
+          <p:cNvPr id="369" name="Google Shape;369;g129b6330eb3_0_366:notes"/>
           <p:cNvSpPr/>
           <p:nvPr>
             <p:ph idx="2" type="sldImg"/>
@@ -1369,7 +1370,7 @@
       </p:sp>
       <p:sp>
         <p:nvSpPr>
-          <p:cNvPr id="368" name="Google Shape;368;g129b6330eb3_0_370:notes"/>
+          <p:cNvPr id="370" name="Google Shape;370;g129b6330eb3_0_366:notes"/>
           <p:cNvSpPr txBox="1"/>
           <p:nvPr>
             <p:ph idx="1" type="body"/>
@@ -1419,7 +1420,7 @@
   <p:cSld>
     <p:spTree>
       <p:nvGrpSpPr>
-        <p:cNvPr id="372" name="Shape 372"/>
+        <p:cNvPr id="373" name="Shape 373"/>
         <p:cNvGrpSpPr/>
         <p:nvPr/>
       </p:nvGrpSpPr>
@@ -1433,7 +1434,7 @@
       </p:grpSpPr>
       <p:sp>
         <p:nvSpPr>
-          <p:cNvPr id="373" name="Google Shape;373;g129c47ed3ce_0_0:notes"/>
+          <p:cNvPr id="374" name="Google Shape;374;g129b6330eb3_0_370:notes"/>
           <p:cNvSpPr/>
           <p:nvPr>
             <p:ph idx="2" type="sldImg"/>
@@ -1468,7 +1469,7 @@
       </p:sp>
       <p:sp>
         <p:nvSpPr>
-          <p:cNvPr id="374" name="Google Shape;374;g129c47ed3ce_0_0:notes"/>
+          <p:cNvPr id="375" name="Google Shape;375;g129b6330eb3_0_370:notes"/>
           <p:cNvSpPr txBox="1"/>
           <p:nvPr>
             <p:ph idx="1" type="body"/>
@@ -1518,7 +1519,7 @@
   <p:cSld>
     <p:spTree>
       <p:nvGrpSpPr>
-        <p:cNvPr id="378" name="Shape 378"/>
+        <p:cNvPr id="379" name="Shape 379"/>
         <p:cNvGrpSpPr/>
         <p:nvPr/>
       </p:nvGrpSpPr>
@@ -1532,7 +1533,7 @@
       </p:grpSpPr>
       <p:sp>
         <p:nvSpPr>
-          <p:cNvPr id="379" name="Google Shape;379;g129c47ed3ce_0_5:notes"/>
+          <p:cNvPr id="380" name="Google Shape;380;g129c47ed3ce_0_0:notes"/>
           <p:cNvSpPr/>
           <p:nvPr>
             <p:ph idx="2" type="sldImg"/>
@@ -1567,7 +1568,106 @@
       </p:sp>
       <p:sp>
         <p:nvSpPr>
-          <p:cNvPr id="380" name="Google Shape;380;g129c47ed3ce_0_5:notes"/>
+          <p:cNvPr id="381" name="Google Shape;381;g129c47ed3ce_0_0:notes"/>
+          <p:cNvSpPr txBox="1"/>
+          <p:nvPr>
+            <p:ph idx="1" type="body"/>
+          </p:nvPr>
+        </p:nvSpPr>
+        <p:spPr>
+          <a:xfrm>
+            <a:off x="685800" y="4343400"/>
+            <a:ext cx="5486400" cy="4114800"/>
+          </a:xfrm>
+          <a:prstGeom prst="rect">
+            <a:avLst/>
+          </a:prstGeom>
+        </p:spPr>
+        <p:txBody>
+          <a:bodyPr anchorCtr="0" anchor="t" bIns="91425" lIns="91425" spcFirstLastPara="1" rIns="91425" wrap="square" tIns="91425">
+            <a:noAutofit/>
+          </a:bodyPr>
+          <a:lstStyle/>
+          <a:p>
+            <a:pPr indent="0" lvl="0" marL="0" rtl="0" algn="l">
+              <a:spcBef>
+                <a:spcPts val="0"/>
+              </a:spcBef>
+              <a:spcAft>
+                <a:spcPts val="0"/>
+              </a:spcAft>
+              <a:buNone/>
+            </a:pPr>
+            <a:r>
+              <a:t/>
+            </a:r>
+            <a:endParaRPr/>
+          </a:p>
+        </p:txBody>
+      </p:sp>
+    </p:spTree>
+  </p:cSld>
+  <p:clrMapOvr>
+    <a:masterClrMapping/>
+  </p:clrMapOvr>
+</p:notes>
+</file>
+
+<file path=ppt/notesSlides/notesSlide18.xml><?xml version="1.0" encoding="utf-8"?>
+<p:notes xmlns:a="http://schemas.openxmlformats.org/drawingml/2006/main" xmlns:r="http://schemas.openxmlformats.org/officeDocument/2006/relationships" xmlns:mc="http://schemas.openxmlformats.org/markup-compatibility/2006" xmlns:mv="urn:schemas-microsoft-com:mac:vml" xmlns:p="http://schemas.openxmlformats.org/presentationml/2006/main" xmlns:c="http://schemas.openxmlformats.org/drawingml/2006/chart" xmlns:dgm="http://schemas.openxmlformats.org/drawingml/2006/diagram" xmlns:o="urn:schemas-microsoft-com:office:office" xmlns:v="urn:schemas-microsoft-com:vml" xmlns:pvml="urn:schemas-microsoft-com:office:powerpoint" xmlns:com="http://schemas.openxmlformats.org/drawingml/2006/compatibility" xmlns:p14="http://schemas.microsoft.com/office/powerpoint/2010/main" xmlns:p15="http://schemas.microsoft.com/office/powerpoint/2012/main" xmlns:ahyp="http://schemas.microsoft.com/office/drawing/2018/hyperlinkcolor" showMasterPhAnim="0" showMasterSp="0">
+  <p:cSld>
+    <p:spTree>
+      <p:nvGrpSpPr>
+        <p:cNvPr id="385" name="Shape 385"/>
+        <p:cNvGrpSpPr/>
+        <p:nvPr/>
+      </p:nvGrpSpPr>
+      <p:grpSpPr>
+        <a:xfrm>
+          <a:off x="0" y="0"/>
+          <a:ext cx="0" cy="0"/>
+          <a:chOff x="0" y="0"/>
+          <a:chExt cx="0" cy="0"/>
+        </a:xfrm>
+      </p:grpSpPr>
+      <p:sp>
+        <p:nvSpPr>
+          <p:cNvPr id="386" name="Google Shape;386;g129c47ed3ce_0_5:notes"/>
+          <p:cNvSpPr/>
+          <p:nvPr>
+            <p:ph idx="2" type="sldImg"/>
+          </p:nvPr>
+        </p:nvSpPr>
+        <p:spPr>
+          <a:xfrm>
+            <a:off x="381300" y="685800"/>
+            <a:ext cx="6096000" cy="3429000"/>
+          </a:xfrm>
+          <a:custGeom>
+            <a:rect b="b" l="l" r="r" t="t"/>
+            <a:pathLst>
+              <a:path extrusionOk="0" h="120000" w="120000">
+                <a:moveTo>
+                  <a:pt x="0" y="0"/>
+                </a:moveTo>
+                <a:lnTo>
+                  <a:pt x="120000" y="0"/>
+                </a:lnTo>
+                <a:lnTo>
+                  <a:pt x="120000" y="120000"/>
+                </a:lnTo>
+                <a:lnTo>
+                  <a:pt x="0" y="120000"/>
+                </a:lnTo>
+                <a:close/>
+              </a:path>
+            </a:pathLst>
+          </a:custGeom>
+        </p:spPr>
+      </p:sp>
+      <p:sp>
+        <p:nvSpPr>
+          <p:cNvPr id="387" name="Google Shape;387;g129c47ed3ce_0_5:notes"/>
           <p:cNvSpPr txBox="1"/>
           <p:nvPr>
             <p:ph idx="1" type="body"/>
@@ -17649,7 +17749,8 @@
               <a:buNone/>
             </a:pPr>
             <a:r>
-              <a:t/>
+              <a:rPr lang="en"/>
+              <a:t>Deciding which columns to keep</a:t>
             </a:r>
             <a:endParaRPr/>
           </a:p>
@@ -17658,6 +17759,139 @@
       <p:sp>
         <p:nvSpPr>
           <p:cNvPr id="360" name="Google Shape;360;p25"/>
+          <p:cNvSpPr txBox="1"/>
+          <p:nvPr>
+            <p:ph idx="1" type="body"/>
+          </p:nvPr>
+        </p:nvSpPr>
+        <p:spPr>
+          <a:xfrm>
+            <a:off x="1303800" y="1597875"/>
+            <a:ext cx="7030500" cy="2541600"/>
+          </a:xfrm>
+          <a:prstGeom prst="rect">
+            <a:avLst/>
+          </a:prstGeom>
+        </p:spPr>
+        <p:txBody>
+          <a:bodyPr anchorCtr="0" anchor="t" bIns="91425" lIns="91425" spcFirstLastPara="1" rIns="91425" wrap="square" tIns="91425">
+            <a:normAutofit/>
+          </a:bodyPr>
+          <a:lstStyle/>
+          <a:p>
+            <a:pPr indent="0" lvl="0" marL="0" rtl="0" algn="l">
+              <a:spcBef>
+                <a:spcPts val="0"/>
+              </a:spcBef>
+              <a:spcAft>
+                <a:spcPts val="1200"/>
+              </a:spcAft>
+              <a:buNone/>
+            </a:pPr>
+            <a:r>
+              <a:rPr lang="en"/>
+              <a:t>We looked at how excluding records containing NaN values in the 1, 5, and 10 year outcome columns affected the data we had remaining.</a:t>
+            </a:r>
+            <a:endParaRPr/>
+          </a:p>
+        </p:txBody>
+      </p:sp>
+      <p:pic>
+        <p:nvPicPr>
+          <p:cNvPr id="361" name="Google Shape;361;p25"/>
+          <p:cNvPicPr preferRelativeResize="0"/>
+          <p:nvPr/>
+        </p:nvPicPr>
+        <p:blipFill>
+          <a:blip r:embed="rId3">
+            <a:alphaModFix/>
+          </a:blip>
+          <a:stretch>
+            <a:fillRect/>
+          </a:stretch>
+        </p:blipFill>
+        <p:spPr>
+          <a:xfrm>
+            <a:off x="1839413" y="2314475"/>
+            <a:ext cx="5465169" cy="2541600"/>
+          </a:xfrm>
+          <a:prstGeom prst="rect">
+            <a:avLst/>
+          </a:prstGeom>
+          <a:noFill/>
+          <a:ln>
+            <a:noFill/>
+          </a:ln>
+        </p:spPr>
+      </p:pic>
+    </p:spTree>
+  </p:cSld>
+  <p:clrMapOvr>
+    <a:masterClrMapping/>
+  </p:clrMapOvr>
+</p:sld>
+</file>
+
+<file path=ppt/slides/slide14.xml><?xml version="1.0" encoding="utf-8"?>
+<p:sld xmlns:a="http://schemas.openxmlformats.org/drawingml/2006/main" xmlns:r="http://schemas.openxmlformats.org/officeDocument/2006/relationships" xmlns:mc="http://schemas.openxmlformats.org/markup-compatibility/2006" xmlns:mv="urn:schemas-microsoft-com:mac:vml" xmlns:p="http://schemas.openxmlformats.org/presentationml/2006/main" xmlns:c="http://schemas.openxmlformats.org/drawingml/2006/chart" xmlns:dgm="http://schemas.openxmlformats.org/drawingml/2006/diagram" xmlns:o="urn:schemas-microsoft-com:office:office" xmlns:v="urn:schemas-microsoft-com:vml" xmlns:pvml="urn:schemas-microsoft-com:office:powerpoint" xmlns:com="http://schemas.openxmlformats.org/drawingml/2006/compatibility" xmlns:p14="http://schemas.microsoft.com/office/powerpoint/2010/main" xmlns:p15="http://schemas.microsoft.com/office/powerpoint/2012/main" xmlns:ahyp="http://schemas.microsoft.com/office/drawing/2018/hyperlinkcolor">
+  <p:cSld>
+    <p:spTree>
+      <p:nvGrpSpPr>
+        <p:cNvPr id="365" name="Shape 365"/>
+        <p:cNvGrpSpPr/>
+        <p:nvPr/>
+      </p:nvGrpSpPr>
+      <p:grpSpPr>
+        <a:xfrm>
+          <a:off x="0" y="0"/>
+          <a:ext cx="0" cy="0"/>
+          <a:chOff x="0" y="0"/>
+          <a:chExt cx="0" cy="0"/>
+        </a:xfrm>
+      </p:grpSpPr>
+      <p:sp>
+        <p:nvSpPr>
+          <p:cNvPr id="366" name="Google Shape;366;p26"/>
+          <p:cNvSpPr txBox="1"/>
+          <p:nvPr>
+            <p:ph type="title"/>
+          </p:nvPr>
+        </p:nvSpPr>
+        <p:spPr>
+          <a:xfrm>
+            <a:off x="1303800" y="598575"/>
+            <a:ext cx="7030500" cy="999300"/>
+          </a:xfrm>
+          <a:prstGeom prst="rect">
+            <a:avLst/>
+          </a:prstGeom>
+        </p:spPr>
+        <p:txBody>
+          <a:bodyPr anchorCtr="0" anchor="t" bIns="91425" lIns="91425" spcFirstLastPara="1" rIns="91425" wrap="square" tIns="91425">
+            <a:normAutofit/>
+          </a:bodyPr>
+          <a:lstStyle/>
+          <a:p>
+            <a:pPr indent="0" lvl="0" marL="0" rtl="0" algn="l">
+              <a:spcBef>
+                <a:spcPts val="0"/>
+              </a:spcBef>
+              <a:spcAft>
+                <a:spcPts val="0"/>
+              </a:spcAft>
+              <a:buNone/>
+            </a:pPr>
+            <a:r>
+              <a:rPr lang="en"/>
+              <a:t>Merging the two datasets</a:t>
+            </a:r>
+            <a:endParaRPr/>
+          </a:p>
+        </p:txBody>
+      </p:sp>
+      <p:sp>
+        <p:nvSpPr>
+          <p:cNvPr id="367" name="Google Shape;367;p26"/>
           <p:cNvSpPr txBox="1"/>
           <p:nvPr>
             <p:ph idx="1" type="body"/>
@@ -17683,12 +17917,29 @@
                 <a:spcPts val="0"/>
               </a:spcBef>
               <a:spcAft>
-                <a:spcPts val="1200"/>
+                <a:spcPts val="0"/>
               </a:spcAft>
               <a:buNone/>
             </a:pPr>
             <a:r>
-              <a:t/>
+              <a:rPr lang="en"/>
+              <a:t>To keep things easier and cleaner we merged the flows and earnings datasets into one dataset.</a:t>
+            </a:r>
+            <a:endParaRPr/>
+          </a:p>
+          <a:p>
+            <a:pPr indent="0" lvl="0" marL="0" rtl="0" algn="l">
+              <a:spcBef>
+                <a:spcPts val="1200"/>
+              </a:spcBef>
+              <a:spcAft>
+                <a:spcPts val="1200"/>
+              </a:spcAft>
+              <a:buNone/>
+            </a:pPr>
+            <a:r>
+              <a:rPr lang="en"/>
+              <a:t>A primary key column was created by merging column values that would uniquely identify each record. </a:t>
             </a:r>
             <a:endParaRPr/>
           </a:p>
@@ -17702,12 +17953,12 @@
 </p:sld>
 </file>
 
-<file path=ppt/slides/slide14.xml><?xml version="1.0" encoding="utf-8"?>
+<file path=ppt/slides/slide15.xml><?xml version="1.0" encoding="utf-8"?>
 <p:sld xmlns:a="http://schemas.openxmlformats.org/drawingml/2006/main" xmlns:r="http://schemas.openxmlformats.org/officeDocument/2006/relationships" xmlns:mc="http://schemas.openxmlformats.org/markup-compatibility/2006" xmlns:mv="urn:schemas-microsoft-com:mac:vml" xmlns:p="http://schemas.openxmlformats.org/presentationml/2006/main" xmlns:c="http://schemas.openxmlformats.org/drawingml/2006/chart" xmlns:dgm="http://schemas.openxmlformats.org/drawingml/2006/diagram" xmlns:o="urn:schemas-microsoft-com:office:office" xmlns:v="urn:schemas-microsoft-com:vml" xmlns:pvml="urn:schemas-microsoft-com:office:powerpoint" xmlns:com="http://schemas.openxmlformats.org/drawingml/2006/compatibility" xmlns:p14="http://schemas.microsoft.com/office/powerpoint/2010/main" xmlns:p15="http://schemas.microsoft.com/office/powerpoint/2012/main" xmlns:ahyp="http://schemas.microsoft.com/office/drawing/2018/hyperlinkcolor">
   <p:cSld>
     <p:spTree>
       <p:nvGrpSpPr>
-        <p:cNvPr id="364" name="Shape 364"/>
+        <p:cNvPr id="371" name="Shape 371"/>
         <p:cNvGrpSpPr/>
         <p:nvPr/>
       </p:nvGrpSpPr>
@@ -17721,7 +17972,7 @@
       </p:grpSpPr>
       <p:sp>
         <p:nvSpPr>
-          <p:cNvPr id="365" name="Google Shape;365;p26"/>
+          <p:cNvPr id="372" name="Google Shape;372;p27"/>
           <p:cNvSpPr txBox="1"/>
           <p:nvPr>
             <p:ph type="title"/>
@@ -17767,12 +18018,12 @@
 </p:sld>
 </file>
 
-<file path=ppt/slides/slide15.xml><?xml version="1.0" encoding="utf-8"?>
+<file path=ppt/slides/slide16.xml><?xml version="1.0" encoding="utf-8"?>
 <p:sld xmlns:a="http://schemas.openxmlformats.org/drawingml/2006/main" xmlns:r="http://schemas.openxmlformats.org/officeDocument/2006/relationships" xmlns:mc="http://schemas.openxmlformats.org/markup-compatibility/2006" xmlns:mv="urn:schemas-microsoft-com:mac:vml" xmlns:p="http://schemas.openxmlformats.org/presentationml/2006/main" xmlns:c="http://schemas.openxmlformats.org/drawingml/2006/chart" xmlns:dgm="http://schemas.openxmlformats.org/drawingml/2006/diagram" xmlns:o="urn:schemas-microsoft-com:office:office" xmlns:v="urn:schemas-microsoft-com:vml" xmlns:pvml="urn:schemas-microsoft-com:office:powerpoint" xmlns:com="http://schemas.openxmlformats.org/drawingml/2006/compatibility" xmlns:p14="http://schemas.microsoft.com/office/powerpoint/2010/main" xmlns:p15="http://schemas.microsoft.com/office/powerpoint/2012/main" xmlns:ahyp="http://schemas.microsoft.com/office/drawing/2018/hyperlinkcolor">
   <p:cSld>
     <p:spTree>
       <p:nvGrpSpPr>
-        <p:cNvPr id="369" name="Shape 369"/>
+        <p:cNvPr id="376" name="Shape 376"/>
         <p:cNvGrpSpPr/>
         <p:nvPr/>
       </p:nvGrpSpPr>
@@ -17786,7 +18037,7 @@
       </p:grpSpPr>
       <p:sp>
         <p:nvSpPr>
-          <p:cNvPr id="370" name="Google Shape;370;p27"/>
+          <p:cNvPr id="377" name="Google Shape;377;p28"/>
           <p:cNvSpPr txBox="1"/>
           <p:nvPr>
             <p:ph type="title"/>
@@ -17826,7 +18077,7 @@
       </p:sp>
       <p:sp>
         <p:nvSpPr>
-          <p:cNvPr id="371" name="Google Shape;371;p27"/>
+          <p:cNvPr id="378" name="Google Shape;378;p28"/>
           <p:cNvSpPr txBox="1"/>
           <p:nvPr/>
         </p:nvSpPr>
@@ -17890,12 +18141,12 @@
 </p:sld>
 </file>
 
-<file path=ppt/slides/slide16.xml><?xml version="1.0" encoding="utf-8"?>
+<file path=ppt/slides/slide17.xml><?xml version="1.0" encoding="utf-8"?>
 <p:sld xmlns:a="http://schemas.openxmlformats.org/drawingml/2006/main" xmlns:r="http://schemas.openxmlformats.org/officeDocument/2006/relationships" xmlns:mc="http://schemas.openxmlformats.org/markup-compatibility/2006" xmlns:mv="urn:schemas-microsoft-com:mac:vml" xmlns:p="http://schemas.openxmlformats.org/presentationml/2006/main" xmlns:c="http://schemas.openxmlformats.org/drawingml/2006/chart" xmlns:dgm="http://schemas.openxmlformats.org/drawingml/2006/diagram" xmlns:o="urn:schemas-microsoft-com:office:office" xmlns:v="urn:schemas-microsoft-com:vml" xmlns:pvml="urn:schemas-microsoft-com:office:powerpoint" xmlns:com="http://schemas.openxmlformats.org/drawingml/2006/compatibility" xmlns:p14="http://schemas.microsoft.com/office/powerpoint/2010/main" xmlns:p15="http://schemas.microsoft.com/office/powerpoint/2012/main" xmlns:ahyp="http://schemas.microsoft.com/office/drawing/2018/hyperlinkcolor">
   <p:cSld>
     <p:spTree>
       <p:nvGrpSpPr>
-        <p:cNvPr id="375" name="Shape 375"/>
+        <p:cNvPr id="382" name="Shape 382"/>
         <p:cNvGrpSpPr/>
         <p:nvPr/>
       </p:nvGrpSpPr>
@@ -17909,7 +18160,7 @@
       </p:grpSpPr>
       <p:sp>
         <p:nvSpPr>
-          <p:cNvPr id="376" name="Google Shape;376;p28"/>
+          <p:cNvPr id="383" name="Google Shape;383;p29"/>
           <p:cNvSpPr txBox="1"/>
           <p:nvPr>
             <p:ph type="title"/>
@@ -17949,7 +18200,7 @@
       </p:sp>
       <p:sp>
         <p:nvSpPr>
-          <p:cNvPr id="377" name="Google Shape;377;p28"/>
+          <p:cNvPr id="384" name="Google Shape;384;p29"/>
           <p:cNvSpPr txBox="1"/>
           <p:nvPr>
             <p:ph idx="1" type="body"/>
@@ -18030,12 +18281,12 @@
 </p:sld>
 </file>
 
-<file path=ppt/slides/slide17.xml><?xml version="1.0" encoding="utf-8"?>
+<file path=ppt/slides/slide18.xml><?xml version="1.0" encoding="utf-8"?>
 <p:sld xmlns:a="http://schemas.openxmlformats.org/drawingml/2006/main" xmlns:r="http://schemas.openxmlformats.org/officeDocument/2006/relationships" xmlns:mc="http://schemas.openxmlformats.org/markup-compatibility/2006" xmlns:mv="urn:schemas-microsoft-com:mac:vml" xmlns:p="http://schemas.openxmlformats.org/presentationml/2006/main" xmlns:c="http://schemas.openxmlformats.org/drawingml/2006/chart" xmlns:dgm="http://schemas.openxmlformats.org/drawingml/2006/diagram" xmlns:o="urn:schemas-microsoft-com:office:office" xmlns:v="urn:schemas-microsoft-com:vml" xmlns:pvml="urn:schemas-microsoft-com:office:powerpoint" xmlns:com="http://schemas.openxmlformats.org/drawingml/2006/compatibility" xmlns:p14="http://schemas.microsoft.com/office/powerpoint/2010/main" xmlns:p15="http://schemas.microsoft.com/office/powerpoint/2012/main" xmlns:ahyp="http://schemas.microsoft.com/office/drawing/2018/hyperlinkcolor">
   <p:cSld>
     <p:spTree>
       <p:nvGrpSpPr>
-        <p:cNvPr id="381" name="Shape 381"/>
+        <p:cNvPr id="388" name="Shape 388"/>
         <p:cNvGrpSpPr/>
         <p:nvPr/>
       </p:nvGrpSpPr>
@@ -18049,7 +18300,7 @@
       </p:grpSpPr>
       <p:sp>
         <p:nvSpPr>
-          <p:cNvPr id="382" name="Google Shape;382;p29"/>
+          <p:cNvPr id="389" name="Google Shape;389;p30"/>
           <p:cNvSpPr txBox="1"/>
           <p:nvPr>
             <p:ph type="title"/>
@@ -18089,7 +18340,7 @@
       </p:sp>
       <p:sp>
         <p:nvSpPr>
-          <p:cNvPr id="383" name="Google Shape;383;p29"/>
+          <p:cNvPr id="390" name="Google Shape;390;p30"/>
           <p:cNvSpPr txBox="1"/>
           <p:nvPr>
             <p:ph idx="1" type="body"/>
@@ -18950,6 +19201,285 @@
 </file>
 
 <file path=ppt/theme/theme1.xml><?xml version="1.0" encoding="utf-8"?>
+<a:theme xmlns:a="http://schemas.openxmlformats.org/drawingml/2006/main" xmlns:r="http://schemas.openxmlformats.org/officeDocument/2006/relationships" name="Inertia">
+  <a:themeElements>
+    <a:clrScheme name="Momentum">
+      <a:dk1>
+        <a:srgbClr val="F3F3F3"/>
+      </a:dk1>
+      <a:lt1>
+        <a:srgbClr val="161616"/>
+      </a:lt1>
+      <a:dk2>
+        <a:srgbClr val="FFF2CC"/>
+      </a:dk2>
+      <a:lt2>
+        <a:srgbClr val="8DD8D3"/>
+      </a:lt2>
+      <a:accent1>
+        <a:srgbClr val="0B6374"/>
+      </a:accent1>
+      <a:accent2>
+        <a:srgbClr val="FD5B58"/>
+      </a:accent2>
+      <a:accent3>
+        <a:srgbClr val="F6B26B"/>
+      </a:accent3>
+      <a:accent4>
+        <a:srgbClr val="D7E6A3"/>
+      </a:accent4>
+      <a:accent5>
+        <a:srgbClr val="27278B"/>
+      </a:accent5>
+      <a:accent6>
+        <a:srgbClr val="D558AB"/>
+      </a:accent6>
+      <a:hlink>
+        <a:srgbClr val="27278B"/>
+      </a:hlink>
+      <a:folHlink>
+        <a:srgbClr val="27278B"/>
+      </a:folHlink>
+    </a:clrScheme>
+    <a:fontScheme name="Office">
+      <a:majorFont>
+        <a:latin typeface="Arial"/>
+        <a:ea typeface=""/>
+        <a:cs typeface=""/>
+        <a:font script="Jpan" typeface="ＭＳ Ｐゴシック"/>
+        <a:font script="Hang" typeface="맑은 고딕"/>
+        <a:font script="Hans" typeface="宋体"/>
+        <a:font script="Hant" typeface="新細明體"/>
+        <a:font script="Arab" typeface="Times New Roman"/>
+        <a:font script="Hebr" typeface="Times New Roman"/>
+        <a:font script="Thai" typeface="Angsana New"/>
+        <a:font script="Ethi" typeface="Nyala"/>
+        <a:font script="Beng" typeface="Vrinda"/>
+        <a:font script="Gujr" typeface="Shruti"/>
+        <a:font script="Khmr" typeface="MoolBoran"/>
+        <a:font script="Knda" typeface="Tunga"/>
+        <a:font script="Guru" typeface="Raavi"/>
+        <a:font script="Cans" typeface="Euphemia"/>
+        <a:font script="Cher" typeface="Plantagenet Cherokee"/>
+        <a:font script="Yiii" typeface="Microsoft Yi Baiti"/>
+        <a:font script="Tibt" typeface="Microsoft Himalaya"/>
+        <a:font script="Thaa" typeface="MV Boli"/>
+        <a:font script="Deva" typeface="Mangal"/>
+        <a:font script="Telu" typeface="Gautami"/>
+        <a:font script="Taml" typeface="Latha"/>
+        <a:font script="Syrc" typeface="Estrangelo Edessa"/>
+        <a:font script="Orya" typeface="Kalinga"/>
+        <a:font script="Mlym" typeface="Kartika"/>
+        <a:font script="Laoo" typeface="DokChampa"/>
+        <a:font script="Sinh" typeface="Iskoola Pota"/>
+        <a:font script="Mong" typeface="Mongolian Baiti"/>
+        <a:font script="Viet" typeface="Times New Roman"/>
+        <a:font script="Uigh" typeface="Microsoft Uighur"/>
+        <a:font script="Geor" typeface="Sylfaen"/>
+      </a:majorFont>
+      <a:minorFont>
+        <a:latin typeface="Arial"/>
+        <a:ea typeface=""/>
+        <a:cs typeface=""/>
+        <a:font script="Jpan" typeface="ＭＳ Ｐゴシック"/>
+        <a:font script="Hang" typeface="맑은 고딕"/>
+        <a:font script="Hans" typeface="宋体"/>
+        <a:font script="Hant" typeface="新細明體"/>
+        <a:font script="Arab" typeface="Arial"/>
+        <a:font script="Hebr" typeface="Arial"/>
+        <a:font script="Thai" typeface="Cordia New"/>
+        <a:font script="Ethi" typeface="Nyala"/>
+        <a:font script="Beng" typeface="Vrinda"/>
+        <a:font script="Gujr" typeface="Shruti"/>
+        <a:font script="Khmr" typeface="DaunPenh"/>
+        <a:font script="Knda" typeface="Tunga"/>
+        <a:font script="Guru" typeface="Raavi"/>
+        <a:font script="Cans" typeface="Euphemia"/>
+        <a:font script="Cher" typeface="Plantagenet Cherokee"/>
+        <a:font script="Yiii" typeface="Microsoft Yi Baiti"/>
+        <a:font script="Tibt" typeface="Microsoft Himalaya"/>
+        <a:font script="Thaa" typeface="MV Boli"/>
+        <a:font script="Deva" typeface="Mangal"/>
+        <a:font script="Telu" typeface="Gautami"/>
+        <a:font script="Taml" typeface="Latha"/>
+        <a:font script="Syrc" typeface="Estrangelo Edessa"/>
+        <a:font script="Orya" typeface="Kalinga"/>
+        <a:font script="Mlym" typeface="Kartika"/>
+        <a:font script="Laoo" typeface="DokChampa"/>
+        <a:font script="Sinh" typeface="Iskoola Pota"/>
+        <a:font script="Mong" typeface="Mongolian Baiti"/>
+        <a:font script="Viet" typeface="Arial"/>
+        <a:font script="Uigh" typeface="Microsoft Uighur"/>
+        <a:font script="Geor" typeface="Sylfaen"/>
+      </a:minorFont>
+    </a:fontScheme>
+    <a:fmtScheme name="Office">
+      <a:fillStyleLst>
+        <a:solidFill>
+          <a:schemeClr val="phClr"/>
+        </a:solidFill>
+        <a:gradFill rotWithShape="1">
+          <a:gsLst>
+            <a:gs pos="0">
+              <a:schemeClr val="phClr">
+                <a:tint val="50000"/>
+                <a:satMod val="300000"/>
+              </a:schemeClr>
+            </a:gs>
+            <a:gs pos="35000">
+              <a:schemeClr val="phClr">
+                <a:tint val="37000"/>
+                <a:satMod val="300000"/>
+              </a:schemeClr>
+            </a:gs>
+            <a:gs pos="100000">
+              <a:schemeClr val="phClr">
+                <a:tint val="15000"/>
+                <a:satMod val="350000"/>
+              </a:schemeClr>
+            </a:gs>
+          </a:gsLst>
+          <a:lin ang="16200000" scaled="1"/>
+        </a:gradFill>
+        <a:gradFill rotWithShape="1">
+          <a:gsLst>
+            <a:gs pos="0">
+              <a:schemeClr val="phClr">
+                <a:tint val="100000"/>
+                <a:shade val="100000"/>
+                <a:satMod val="130000"/>
+              </a:schemeClr>
+            </a:gs>
+            <a:gs pos="100000">
+              <a:schemeClr val="phClr">
+                <a:tint val="50000"/>
+                <a:shade val="100000"/>
+                <a:satMod val="350000"/>
+              </a:schemeClr>
+            </a:gs>
+          </a:gsLst>
+          <a:lin ang="16200000" scaled="0"/>
+        </a:gradFill>
+      </a:fillStyleLst>
+      <a:lnStyleLst>
+        <a:ln w="9525" cap="flat" cmpd="sng" algn="ctr">
+          <a:solidFill>
+            <a:schemeClr val="phClr">
+              <a:shade val="95000"/>
+              <a:satMod val="105000"/>
+            </a:schemeClr>
+          </a:solidFill>
+          <a:prstDash val="solid"/>
+        </a:ln>
+        <a:ln w="25400" cap="flat" cmpd="sng" algn="ctr">
+          <a:solidFill>
+            <a:schemeClr val="phClr"/>
+          </a:solidFill>
+          <a:prstDash val="solid"/>
+        </a:ln>
+        <a:ln w="38100" cap="flat" cmpd="sng" algn="ctr">
+          <a:solidFill>
+            <a:schemeClr val="phClr"/>
+          </a:solidFill>
+          <a:prstDash val="solid"/>
+        </a:ln>
+      </a:lnStyleLst>
+      <a:effectStyleLst>
+        <a:effectStyle>
+          <a:effectLst>
+            <a:outerShdw blurRad="40000" dist="20000" dir="5400000" rotWithShape="0">
+              <a:srgbClr val="000000">
+                <a:alpha val="38000"/>
+              </a:srgbClr>
+            </a:outerShdw>
+          </a:effectLst>
+        </a:effectStyle>
+        <a:effectStyle>
+          <a:effectLst>
+            <a:outerShdw blurRad="40000" dist="23000" dir="5400000" rotWithShape="0">
+              <a:srgbClr val="000000">
+                <a:alpha val="35000"/>
+              </a:srgbClr>
+            </a:outerShdw>
+          </a:effectLst>
+        </a:effectStyle>
+        <a:effectStyle>
+          <a:effectLst>
+            <a:outerShdw blurRad="40000" dist="23000" dir="5400000" rotWithShape="0">
+              <a:srgbClr val="000000">
+                <a:alpha val="35000"/>
+              </a:srgbClr>
+            </a:outerShdw>
+          </a:effectLst>
+          <a:scene3d>
+            <a:camera prst="orthographicFront">
+              <a:rot lat="0" lon="0" rev="0"/>
+            </a:camera>
+            <a:lightRig rig="threePt" dir="t">
+              <a:rot lat="0" lon="0" rev="1200000"/>
+            </a:lightRig>
+          </a:scene3d>
+          <a:sp3d>
+            <a:bevelT w="63500" h="25400"/>
+          </a:sp3d>
+        </a:effectStyle>
+      </a:effectStyleLst>
+      <a:bgFillStyleLst>
+        <a:solidFill>
+          <a:schemeClr val="phClr"/>
+        </a:solidFill>
+        <a:gradFill rotWithShape="1">
+          <a:gsLst>
+            <a:gs pos="0">
+              <a:schemeClr val="phClr">
+                <a:tint val="40000"/>
+                <a:satMod val="350000"/>
+              </a:schemeClr>
+            </a:gs>
+            <a:gs pos="40000">
+              <a:schemeClr val="phClr">
+                <a:tint val="45000"/>
+                <a:shade val="99000"/>
+                <a:satMod val="350000"/>
+              </a:schemeClr>
+            </a:gs>
+            <a:gs pos="100000">
+              <a:schemeClr val="phClr">
+                <a:shade val="20000"/>
+                <a:satMod val="255000"/>
+              </a:schemeClr>
+            </a:gs>
+          </a:gsLst>
+          <a:path path="circle">
+            <a:fillToRect l="50000" t="-80000" r="50000" b="180000"/>
+          </a:path>
+        </a:gradFill>
+        <a:gradFill rotWithShape="1">
+          <a:gsLst>
+            <a:gs pos="0">
+              <a:schemeClr val="phClr">
+                <a:tint val="80000"/>
+                <a:satMod val="300000"/>
+              </a:schemeClr>
+            </a:gs>
+            <a:gs pos="100000">
+              <a:schemeClr val="phClr">
+                <a:shade val="30000"/>
+                <a:satMod val="200000"/>
+              </a:schemeClr>
+            </a:gs>
+          </a:gsLst>
+          <a:path path="circle">
+            <a:fillToRect l="50000" t="50000" r="50000" b="50000"/>
+          </a:path>
+        </a:gradFill>
+      </a:bgFillStyleLst>
+    </a:fmtScheme>
+  </a:themeElements>
+</a:theme>
+</file>
+
+<file path=ppt/theme/theme2.xml><?xml version="1.0" encoding="utf-8"?>
 <a:theme xmlns:a="http://schemas.openxmlformats.org/drawingml/2006/main" xmlns:r="http://schemas.openxmlformats.org/officeDocument/2006/relationships">
   <a:themeElements>
     <a:clrScheme name="Default">
@@ -19226,283 +19756,4 @@
     </a:fmtScheme>
   </a:themeElements>
 </a:theme>
-</file>
-
-<file path=ppt/theme/theme2.xml><?xml version="1.0" encoding="utf-8"?>
-<a:theme xmlns:a="http://schemas.openxmlformats.org/drawingml/2006/main" xmlns:r="http://schemas.openxmlformats.org/officeDocument/2006/relationships" name="Inertia">
-  <a:themeElements>
-    <a:clrScheme name="Momentum">
-      <a:dk1>
-        <a:srgbClr val="F3F3F3"/>
-      </a:dk1>
-      <a:lt1>
-        <a:srgbClr val="161616"/>
-      </a:lt1>
-      <a:dk2>
-        <a:srgbClr val="FFF2CC"/>
-      </a:dk2>
-      <a:lt2>
-        <a:srgbClr val="8DD8D3"/>
-      </a:lt2>
-      <a:accent1>
-        <a:srgbClr val="0B6374"/>
-      </a:accent1>
-      <a:accent2>
-        <a:srgbClr val="FD5B58"/>
-      </a:accent2>
-      <a:accent3>
-        <a:srgbClr val="F6B26B"/>
-      </a:accent3>
-      <a:accent4>
-        <a:srgbClr val="D7E6A3"/>
-      </a:accent4>
-      <a:accent5>
-        <a:srgbClr val="27278B"/>
-      </a:accent5>
-      <a:accent6>
-        <a:srgbClr val="D558AB"/>
-      </a:accent6>
-      <a:hlink>
-        <a:srgbClr val="27278B"/>
-      </a:hlink>
-      <a:folHlink>
-        <a:srgbClr val="27278B"/>
-      </a:folHlink>
-    </a:clrScheme>
-    <a:fontScheme name="Office">
-      <a:majorFont>
-        <a:latin typeface="Arial"/>
-        <a:ea typeface=""/>
-        <a:cs typeface=""/>
-        <a:font script="Jpan" typeface="ＭＳ Ｐゴシック"/>
-        <a:font script="Hang" typeface="맑은 고딕"/>
-        <a:font script="Hans" typeface="宋体"/>
-        <a:font script="Hant" typeface="新細明體"/>
-        <a:font script="Arab" typeface="Times New Roman"/>
-        <a:font script="Hebr" typeface="Times New Roman"/>
-        <a:font script="Thai" typeface="Angsana New"/>
-        <a:font script="Ethi" typeface="Nyala"/>
-        <a:font script="Beng" typeface="Vrinda"/>
-        <a:font script="Gujr" typeface="Shruti"/>
-        <a:font script="Khmr" typeface="MoolBoran"/>
-        <a:font script="Knda" typeface="Tunga"/>
-        <a:font script="Guru" typeface="Raavi"/>
-        <a:font script="Cans" typeface="Euphemia"/>
-        <a:font script="Cher" typeface="Plantagenet Cherokee"/>
-        <a:font script="Yiii" typeface="Microsoft Yi Baiti"/>
-        <a:font script="Tibt" typeface="Microsoft Himalaya"/>
-        <a:font script="Thaa" typeface="MV Boli"/>
-        <a:font script="Deva" typeface="Mangal"/>
-        <a:font script="Telu" typeface="Gautami"/>
-        <a:font script="Taml" typeface="Latha"/>
-        <a:font script="Syrc" typeface="Estrangelo Edessa"/>
-        <a:font script="Orya" typeface="Kalinga"/>
-        <a:font script="Mlym" typeface="Kartika"/>
-        <a:font script="Laoo" typeface="DokChampa"/>
-        <a:font script="Sinh" typeface="Iskoola Pota"/>
-        <a:font script="Mong" typeface="Mongolian Baiti"/>
-        <a:font script="Viet" typeface="Times New Roman"/>
-        <a:font script="Uigh" typeface="Microsoft Uighur"/>
-        <a:font script="Geor" typeface="Sylfaen"/>
-      </a:majorFont>
-      <a:minorFont>
-        <a:latin typeface="Arial"/>
-        <a:ea typeface=""/>
-        <a:cs typeface=""/>
-        <a:font script="Jpan" typeface="ＭＳ Ｐゴシック"/>
-        <a:font script="Hang" typeface="맑은 고딕"/>
-        <a:font script="Hans" typeface="宋体"/>
-        <a:font script="Hant" typeface="新細明體"/>
-        <a:font script="Arab" typeface="Arial"/>
-        <a:font script="Hebr" typeface="Arial"/>
-        <a:font script="Thai" typeface="Cordia New"/>
-        <a:font script="Ethi" typeface="Nyala"/>
-        <a:font script="Beng" typeface="Vrinda"/>
-        <a:font script="Gujr" typeface="Shruti"/>
-        <a:font script="Khmr" typeface="DaunPenh"/>
-        <a:font script="Knda" typeface="Tunga"/>
-        <a:font script="Guru" typeface="Raavi"/>
-        <a:font script="Cans" typeface="Euphemia"/>
-        <a:font script="Cher" typeface="Plantagenet Cherokee"/>
-        <a:font script="Yiii" typeface="Microsoft Yi Baiti"/>
-        <a:font script="Tibt" typeface="Microsoft Himalaya"/>
-        <a:font script="Thaa" typeface="MV Boli"/>
-        <a:font script="Deva" typeface="Mangal"/>
-        <a:font script="Telu" typeface="Gautami"/>
-        <a:font script="Taml" typeface="Latha"/>
-        <a:font script="Syrc" typeface="Estrangelo Edessa"/>
-        <a:font script="Orya" typeface="Kalinga"/>
-        <a:font script="Mlym" typeface="Kartika"/>
-        <a:font script="Laoo" typeface="DokChampa"/>
-        <a:font script="Sinh" typeface="Iskoola Pota"/>
-        <a:font script="Mong" typeface="Mongolian Baiti"/>
-        <a:font script="Viet" typeface="Arial"/>
-        <a:font script="Uigh" typeface="Microsoft Uighur"/>
-        <a:font script="Geor" typeface="Sylfaen"/>
-      </a:minorFont>
-    </a:fontScheme>
-    <a:fmtScheme name="Office">
-      <a:fillStyleLst>
-        <a:solidFill>
-          <a:schemeClr val="phClr"/>
-        </a:solidFill>
-        <a:gradFill rotWithShape="1">
-          <a:gsLst>
-            <a:gs pos="0">
-              <a:schemeClr val="phClr">
-                <a:tint val="50000"/>
-                <a:satMod val="300000"/>
-              </a:schemeClr>
-            </a:gs>
-            <a:gs pos="35000">
-              <a:schemeClr val="phClr">
-                <a:tint val="37000"/>
-                <a:satMod val="300000"/>
-              </a:schemeClr>
-            </a:gs>
-            <a:gs pos="100000">
-              <a:schemeClr val="phClr">
-                <a:tint val="15000"/>
-                <a:satMod val="350000"/>
-              </a:schemeClr>
-            </a:gs>
-          </a:gsLst>
-          <a:lin ang="16200000" scaled="1"/>
-        </a:gradFill>
-        <a:gradFill rotWithShape="1">
-          <a:gsLst>
-            <a:gs pos="0">
-              <a:schemeClr val="phClr">
-                <a:tint val="100000"/>
-                <a:shade val="100000"/>
-                <a:satMod val="130000"/>
-              </a:schemeClr>
-            </a:gs>
-            <a:gs pos="100000">
-              <a:schemeClr val="phClr">
-                <a:tint val="50000"/>
-                <a:shade val="100000"/>
-                <a:satMod val="350000"/>
-              </a:schemeClr>
-            </a:gs>
-          </a:gsLst>
-          <a:lin ang="16200000" scaled="0"/>
-        </a:gradFill>
-      </a:fillStyleLst>
-      <a:lnStyleLst>
-        <a:ln w="9525" cap="flat" cmpd="sng" algn="ctr">
-          <a:solidFill>
-            <a:schemeClr val="phClr">
-              <a:shade val="95000"/>
-              <a:satMod val="105000"/>
-            </a:schemeClr>
-          </a:solidFill>
-          <a:prstDash val="solid"/>
-        </a:ln>
-        <a:ln w="25400" cap="flat" cmpd="sng" algn="ctr">
-          <a:solidFill>
-            <a:schemeClr val="phClr"/>
-          </a:solidFill>
-          <a:prstDash val="solid"/>
-        </a:ln>
-        <a:ln w="38100" cap="flat" cmpd="sng" algn="ctr">
-          <a:solidFill>
-            <a:schemeClr val="phClr"/>
-          </a:solidFill>
-          <a:prstDash val="solid"/>
-        </a:ln>
-      </a:lnStyleLst>
-      <a:effectStyleLst>
-        <a:effectStyle>
-          <a:effectLst>
-            <a:outerShdw blurRad="40000" dist="20000" dir="5400000" rotWithShape="0">
-              <a:srgbClr val="000000">
-                <a:alpha val="38000"/>
-              </a:srgbClr>
-            </a:outerShdw>
-          </a:effectLst>
-        </a:effectStyle>
-        <a:effectStyle>
-          <a:effectLst>
-            <a:outerShdw blurRad="40000" dist="23000" dir="5400000" rotWithShape="0">
-              <a:srgbClr val="000000">
-                <a:alpha val="35000"/>
-              </a:srgbClr>
-            </a:outerShdw>
-          </a:effectLst>
-        </a:effectStyle>
-        <a:effectStyle>
-          <a:effectLst>
-            <a:outerShdw blurRad="40000" dist="23000" dir="5400000" rotWithShape="0">
-              <a:srgbClr val="000000">
-                <a:alpha val="35000"/>
-              </a:srgbClr>
-            </a:outerShdw>
-          </a:effectLst>
-          <a:scene3d>
-            <a:camera prst="orthographicFront">
-              <a:rot lat="0" lon="0" rev="0"/>
-            </a:camera>
-            <a:lightRig rig="threePt" dir="t">
-              <a:rot lat="0" lon="0" rev="1200000"/>
-            </a:lightRig>
-          </a:scene3d>
-          <a:sp3d>
-            <a:bevelT w="63500" h="25400"/>
-          </a:sp3d>
-        </a:effectStyle>
-      </a:effectStyleLst>
-      <a:bgFillStyleLst>
-        <a:solidFill>
-          <a:schemeClr val="phClr"/>
-        </a:solidFill>
-        <a:gradFill rotWithShape="1">
-          <a:gsLst>
-            <a:gs pos="0">
-              <a:schemeClr val="phClr">
-                <a:tint val="40000"/>
-                <a:satMod val="350000"/>
-              </a:schemeClr>
-            </a:gs>
-            <a:gs pos="40000">
-              <a:schemeClr val="phClr">
-                <a:tint val="45000"/>
-                <a:shade val="99000"/>
-                <a:satMod val="350000"/>
-              </a:schemeClr>
-            </a:gs>
-            <a:gs pos="100000">
-              <a:schemeClr val="phClr">
-                <a:shade val="20000"/>
-                <a:satMod val="255000"/>
-              </a:schemeClr>
-            </a:gs>
-          </a:gsLst>
-          <a:path path="circle">
-            <a:fillToRect l="50000" t="-80000" r="50000" b="180000"/>
-          </a:path>
-        </a:gradFill>
-        <a:gradFill rotWithShape="1">
-          <a:gsLst>
-            <a:gs pos="0">
-              <a:schemeClr val="phClr">
-                <a:tint val="80000"/>
-                <a:satMod val="300000"/>
-              </a:schemeClr>
-            </a:gs>
-            <a:gs pos="100000">
-              <a:schemeClr val="phClr">
-                <a:shade val="30000"/>
-                <a:satMod val="200000"/>
-              </a:schemeClr>
-            </a:gs>
-          </a:gsLst>
-          <a:path path="circle">
-            <a:fillToRect l="50000" t="50000" r="50000" b="50000"/>
-          </a:path>
-        </a:gradFill>
-      </a:bgFillStyleLst>
-    </a:fmtScheme>
-  </a:themeElements>
-</a:theme>
 </file>
</xml_diff>

<commit_message>
Added dashboard storyboard to presentation
</commit_message>
<xml_diff>
--- a/media/Final Project - Employment Prosepects.pptx
+++ b/media/Final Project - Employment Prosepects.pptx
@@ -1519,7 +1519,7 @@
   <p:cSld>
     <p:spTree>
       <p:nvGrpSpPr>
-        <p:cNvPr id="379" name="Shape 379"/>
+        <p:cNvPr id="389" name="Shape 389"/>
         <p:cNvGrpSpPr/>
         <p:nvPr/>
       </p:nvGrpSpPr>
@@ -1533,7 +1533,7 @@
       </p:grpSpPr>
       <p:sp>
         <p:nvSpPr>
-          <p:cNvPr id="380" name="Google Shape;380;g129c47ed3ce_0_0:notes"/>
+          <p:cNvPr id="390" name="Google Shape;390;g129c47ed3ce_0_0:notes"/>
           <p:cNvSpPr/>
           <p:nvPr>
             <p:ph idx="2" type="sldImg"/>
@@ -1568,7 +1568,7 @@
       </p:sp>
       <p:sp>
         <p:nvSpPr>
-          <p:cNvPr id="381" name="Google Shape;381;g129c47ed3ce_0_0:notes"/>
+          <p:cNvPr id="391" name="Google Shape;391;g129c47ed3ce_0_0:notes"/>
           <p:cNvSpPr txBox="1"/>
           <p:nvPr>
             <p:ph idx="1" type="body"/>
@@ -1618,7 +1618,7 @@
   <p:cSld>
     <p:spTree>
       <p:nvGrpSpPr>
-        <p:cNvPr id="385" name="Shape 385"/>
+        <p:cNvPr id="395" name="Shape 395"/>
         <p:cNvGrpSpPr/>
         <p:nvPr/>
       </p:nvGrpSpPr>
@@ -1632,7 +1632,7 @@
       </p:grpSpPr>
       <p:sp>
         <p:nvSpPr>
-          <p:cNvPr id="386" name="Google Shape;386;g129c47ed3ce_0_5:notes"/>
+          <p:cNvPr id="396" name="Google Shape;396;g129c47ed3ce_0_5:notes"/>
           <p:cNvSpPr/>
           <p:nvPr>
             <p:ph idx="2" type="sldImg"/>
@@ -1667,7 +1667,7 @@
       </p:sp>
       <p:sp>
         <p:nvSpPr>
-          <p:cNvPr id="387" name="Google Shape;387;g129c47ed3ce_0_5:notes"/>
+          <p:cNvPr id="397" name="Google Shape;397;g129c47ed3ce_0_5:notes"/>
           <p:cNvSpPr txBox="1"/>
           <p:nvPr>
             <p:ph idx="1" type="body"/>
@@ -18083,7 +18083,7 @@
         </p:nvSpPr>
         <p:spPr>
           <a:xfrm>
-            <a:off x="2923850" y="2194875"/>
+            <a:off x="3242250" y="4501925"/>
             <a:ext cx="3153600" cy="477000"/>
           </a:xfrm>
           <a:prstGeom prst="rect">
@@ -18100,7 +18100,7 @@
           </a:bodyPr>
           <a:lstStyle/>
           <a:p>
-            <a:pPr indent="0" lvl="0" marL="0" rtl="0" algn="l">
+            <a:pPr indent="0" lvl="0" marL="0" rtl="0" algn="ctr">
               <a:spcBef>
                 <a:spcPts val="0"/>
               </a:spcBef>
@@ -18119,12 +18119,773 @@
                 <a:cs typeface="Nunito"/>
                 <a:sym typeface="Nunito"/>
               </a:rPr>
-              <a:t>Placeholder for storyboard</a:t>
+              <a:t>Storyboard</a:t>
             </a:r>
             <a:endParaRPr sz="1900">
               <a:solidFill>
                 <a:schemeClr val="dk1"/>
               </a:solidFill>
+              <a:latin typeface="Nunito"/>
+              <a:ea typeface="Nunito"/>
+              <a:cs typeface="Nunito"/>
+              <a:sym typeface="Nunito"/>
+            </a:endParaRPr>
+          </a:p>
+        </p:txBody>
+      </p:sp>
+      <p:sp>
+        <p:nvSpPr>
+          <p:cNvPr id="379" name="Google Shape;379;p28"/>
+          <p:cNvSpPr/>
+          <p:nvPr/>
+        </p:nvSpPr>
+        <p:spPr>
+          <a:xfrm>
+            <a:off x="779200" y="1182900"/>
+            <a:ext cx="7555200" cy="3229500"/>
+          </a:xfrm>
+          <a:prstGeom prst="rect">
+            <a:avLst/>
+          </a:prstGeom>
+          <a:solidFill>
+            <a:schemeClr val="dk1"/>
+          </a:solidFill>
+          <a:ln cap="flat" cmpd="sng" w="9525">
+            <a:solidFill>
+              <a:schemeClr val="dk2"/>
+            </a:solidFill>
+            <a:prstDash val="solid"/>
+            <a:round/>
+            <a:headEnd len="sm" w="sm" type="none"/>
+            <a:tailEnd len="sm" w="sm" type="none"/>
+          </a:ln>
+        </p:spPr>
+        <p:txBody>
+          <a:bodyPr anchorCtr="0" anchor="ctr" bIns="91425" lIns="91425" spcFirstLastPara="1" rIns="91425" wrap="square" tIns="91425">
+            <a:noAutofit/>
+          </a:bodyPr>
+          <a:lstStyle/>
+          <a:p>
+            <a:pPr indent="0" lvl="0" marL="0" rtl="0" algn="l">
+              <a:spcBef>
+                <a:spcPts val="0"/>
+              </a:spcBef>
+              <a:spcAft>
+                <a:spcPts val="0"/>
+              </a:spcAft>
+              <a:buNone/>
+            </a:pPr>
+            <a:r>
+              <a:t/>
+            </a:r>
+            <a:endParaRPr/>
+          </a:p>
+        </p:txBody>
+      </p:sp>
+      <p:sp>
+        <p:nvSpPr>
+          <p:cNvPr id="380" name="Google Shape;380;p28"/>
+          <p:cNvSpPr/>
+          <p:nvPr/>
+        </p:nvSpPr>
+        <p:spPr>
+          <a:xfrm>
+            <a:off x="2703775" y="1276775"/>
+            <a:ext cx="4158900" cy="2027700"/>
+          </a:xfrm>
+          <a:prstGeom prst="rect">
+            <a:avLst/>
+          </a:prstGeom>
+          <a:noFill/>
+          <a:ln cap="flat" cmpd="sng" w="19050">
+            <a:solidFill>
+              <a:schemeClr val="lt1"/>
+            </a:solidFill>
+            <a:prstDash val="solid"/>
+            <a:round/>
+            <a:headEnd len="sm" w="sm" type="none"/>
+            <a:tailEnd len="sm" w="sm" type="none"/>
+          </a:ln>
+        </p:spPr>
+        <p:txBody>
+          <a:bodyPr anchorCtr="0" anchor="ctr" bIns="91425" lIns="91425" spcFirstLastPara="1" rIns="91425" wrap="square" tIns="91425">
+            <a:noAutofit/>
+          </a:bodyPr>
+          <a:lstStyle/>
+          <a:p>
+            <a:pPr indent="0" lvl="0" marL="0" rtl="0" algn="l">
+              <a:spcBef>
+                <a:spcPts val="0"/>
+              </a:spcBef>
+              <a:spcAft>
+                <a:spcPts val="0"/>
+              </a:spcAft>
+              <a:buNone/>
+            </a:pPr>
+            <a:r>
+              <a:t/>
+            </a:r>
+            <a:endParaRPr/>
+          </a:p>
+        </p:txBody>
+      </p:sp>
+      <p:sp>
+        <p:nvSpPr>
+          <p:cNvPr id="381" name="Google Shape;381;p28"/>
+          <p:cNvSpPr/>
+          <p:nvPr/>
+        </p:nvSpPr>
+        <p:spPr>
+          <a:xfrm>
+            <a:off x="854325" y="1276775"/>
+            <a:ext cx="1746300" cy="3032400"/>
+          </a:xfrm>
+          <a:prstGeom prst="rect">
+            <a:avLst/>
+          </a:prstGeom>
+          <a:noFill/>
+          <a:ln cap="flat" cmpd="sng" w="19050">
+            <a:solidFill>
+              <a:schemeClr val="lt1"/>
+            </a:solidFill>
+            <a:prstDash val="solid"/>
+            <a:round/>
+            <a:headEnd len="sm" w="sm" type="none"/>
+            <a:tailEnd len="sm" w="sm" type="none"/>
+          </a:ln>
+        </p:spPr>
+        <p:txBody>
+          <a:bodyPr anchorCtr="0" anchor="ctr" bIns="91425" lIns="91425" spcFirstLastPara="1" rIns="91425" wrap="square" tIns="91425">
+            <a:noAutofit/>
+          </a:bodyPr>
+          <a:lstStyle/>
+          <a:p>
+            <a:pPr indent="0" lvl="0" marL="0" rtl="0" algn="l">
+              <a:spcBef>
+                <a:spcPts val="0"/>
+              </a:spcBef>
+              <a:spcAft>
+                <a:spcPts val="0"/>
+              </a:spcAft>
+              <a:buNone/>
+            </a:pPr>
+            <a:r>
+              <a:t/>
+            </a:r>
+            <a:endParaRPr/>
+          </a:p>
+        </p:txBody>
+      </p:sp>
+      <p:sp>
+        <p:nvSpPr>
+          <p:cNvPr id="382" name="Google Shape;382;p28"/>
+          <p:cNvSpPr/>
+          <p:nvPr/>
+        </p:nvSpPr>
+        <p:spPr>
+          <a:xfrm>
+            <a:off x="6947175" y="1276775"/>
+            <a:ext cx="1305000" cy="3032400"/>
+          </a:xfrm>
+          <a:prstGeom prst="rect">
+            <a:avLst/>
+          </a:prstGeom>
+          <a:noFill/>
+          <a:ln cap="flat" cmpd="sng" w="19050">
+            <a:solidFill>
+              <a:schemeClr val="lt1"/>
+            </a:solidFill>
+            <a:prstDash val="solid"/>
+            <a:round/>
+            <a:headEnd len="sm" w="sm" type="none"/>
+            <a:tailEnd len="sm" w="sm" type="none"/>
+          </a:ln>
+        </p:spPr>
+        <p:txBody>
+          <a:bodyPr anchorCtr="0" anchor="ctr" bIns="91425" lIns="91425" spcFirstLastPara="1" rIns="91425" wrap="square" tIns="91425">
+            <a:noAutofit/>
+          </a:bodyPr>
+          <a:lstStyle/>
+          <a:p>
+            <a:pPr indent="0" lvl="0" marL="0" rtl="0" algn="l">
+              <a:spcBef>
+                <a:spcPts val="0"/>
+              </a:spcBef>
+              <a:spcAft>
+                <a:spcPts val="0"/>
+              </a:spcAft>
+              <a:buNone/>
+            </a:pPr>
+            <a:r>
+              <a:t/>
+            </a:r>
+            <a:endParaRPr/>
+          </a:p>
+        </p:txBody>
+      </p:sp>
+      <p:sp>
+        <p:nvSpPr>
+          <p:cNvPr id="383" name="Google Shape;383;p28"/>
+          <p:cNvSpPr txBox="1"/>
+          <p:nvPr/>
+        </p:nvSpPr>
+        <p:spPr>
+          <a:xfrm>
+            <a:off x="938800" y="1380050"/>
+            <a:ext cx="1464600" cy="400200"/>
+          </a:xfrm>
+          <a:prstGeom prst="rect">
+            <a:avLst/>
+          </a:prstGeom>
+          <a:noFill/>
+          <a:ln cap="flat" cmpd="sng" w="9525">
+            <a:solidFill>
+              <a:schemeClr val="lt1"/>
+            </a:solidFill>
+            <a:prstDash val="solid"/>
+            <a:round/>
+            <a:headEnd len="sm" w="sm" type="none"/>
+            <a:tailEnd len="sm" w="sm" type="none"/>
+          </a:ln>
+        </p:spPr>
+        <p:txBody>
+          <a:bodyPr anchorCtr="0" anchor="t" bIns="91425" lIns="91425" spcFirstLastPara="1" rIns="91425" wrap="square" tIns="91425">
+            <a:spAutoFit/>
+          </a:bodyPr>
+          <a:lstStyle/>
+          <a:p>
+            <a:pPr indent="0" lvl="0" marL="0" rtl="0" algn="l">
+              <a:spcBef>
+                <a:spcPts val="0"/>
+              </a:spcBef>
+              <a:spcAft>
+                <a:spcPts val="0"/>
+              </a:spcAft>
+              <a:buNone/>
+            </a:pPr>
+            <a:r>
+              <a:rPr lang="en">
+                <a:latin typeface="Nunito"/>
+                <a:ea typeface="Nunito"/>
+                <a:cs typeface="Nunito"/>
+                <a:sym typeface="Nunito"/>
+              </a:rPr>
+              <a:t>Search by name</a:t>
+            </a:r>
+            <a:endParaRPr>
+              <a:latin typeface="Nunito"/>
+              <a:ea typeface="Nunito"/>
+              <a:cs typeface="Nunito"/>
+              <a:sym typeface="Nunito"/>
+            </a:endParaRPr>
+          </a:p>
+        </p:txBody>
+      </p:sp>
+      <p:sp>
+        <p:nvSpPr>
+          <p:cNvPr id="384" name="Google Shape;384;p28"/>
+          <p:cNvSpPr txBox="1"/>
+          <p:nvPr/>
+        </p:nvSpPr>
+        <p:spPr>
+          <a:xfrm>
+            <a:off x="957575" y="1877625"/>
+            <a:ext cx="1464600" cy="2339700"/>
+          </a:xfrm>
+          <a:prstGeom prst="rect">
+            <a:avLst/>
+          </a:prstGeom>
+          <a:noFill/>
+          <a:ln cap="flat" cmpd="sng" w="9525">
+            <a:solidFill>
+              <a:schemeClr val="lt1"/>
+            </a:solidFill>
+            <a:prstDash val="solid"/>
+            <a:round/>
+            <a:headEnd len="sm" w="sm" type="none"/>
+            <a:tailEnd len="sm" w="sm" type="none"/>
+          </a:ln>
+        </p:spPr>
+        <p:txBody>
+          <a:bodyPr anchorCtr="0" anchor="t" bIns="91425" lIns="91425" spcFirstLastPara="1" rIns="91425" wrap="square" tIns="91425">
+            <a:spAutoFit/>
+          </a:bodyPr>
+          <a:lstStyle/>
+          <a:p>
+            <a:pPr indent="0" lvl="0" marL="0" rtl="0" algn="l">
+              <a:spcBef>
+                <a:spcPts val="0"/>
+              </a:spcBef>
+              <a:spcAft>
+                <a:spcPts val="0"/>
+              </a:spcAft>
+              <a:buNone/>
+            </a:pPr>
+            <a:r>
+              <a:rPr lang="en">
+                <a:latin typeface="Nunito"/>
+                <a:ea typeface="Nunito"/>
+                <a:cs typeface="Nunito"/>
+                <a:sym typeface="Nunito"/>
+              </a:rPr>
+              <a:t>Filters</a:t>
+            </a:r>
+            <a:endParaRPr>
+              <a:latin typeface="Nunito"/>
+              <a:ea typeface="Nunito"/>
+              <a:cs typeface="Nunito"/>
+              <a:sym typeface="Nunito"/>
+            </a:endParaRPr>
+          </a:p>
+          <a:p>
+            <a:pPr indent="-317500" lvl="0" marL="457200" rtl="0" algn="l">
+              <a:spcBef>
+                <a:spcPts val="0"/>
+              </a:spcBef>
+              <a:spcAft>
+                <a:spcPts val="0"/>
+              </a:spcAft>
+              <a:buSzPts val="1400"/>
+              <a:buFont typeface="Nunito"/>
+              <a:buChar char="❏"/>
+            </a:pPr>
+            <a:r>
+              <a:rPr lang="en">
+                <a:latin typeface="Nunito"/>
+                <a:ea typeface="Nunito"/>
+                <a:cs typeface="Nunito"/>
+                <a:sym typeface="Nunito"/>
+              </a:rPr>
+              <a:t>Cat 1</a:t>
+            </a:r>
+            <a:endParaRPr>
+              <a:latin typeface="Nunito"/>
+              <a:ea typeface="Nunito"/>
+              <a:cs typeface="Nunito"/>
+              <a:sym typeface="Nunito"/>
+            </a:endParaRPr>
+          </a:p>
+          <a:p>
+            <a:pPr indent="-317500" lvl="1" marL="914400" rtl="0" algn="l">
+              <a:spcBef>
+                <a:spcPts val="0"/>
+              </a:spcBef>
+              <a:spcAft>
+                <a:spcPts val="0"/>
+              </a:spcAft>
+              <a:buSzPts val="1400"/>
+              <a:buFont typeface="Nunito"/>
+              <a:buChar char="❏"/>
+            </a:pPr>
+            <a:r>
+              <a:rPr lang="en">
+                <a:latin typeface="Nunito"/>
+                <a:ea typeface="Nunito"/>
+                <a:cs typeface="Nunito"/>
+                <a:sym typeface="Nunito"/>
+              </a:rPr>
+              <a:t>1</a:t>
+            </a:r>
+            <a:endParaRPr>
+              <a:latin typeface="Nunito"/>
+              <a:ea typeface="Nunito"/>
+              <a:cs typeface="Nunito"/>
+              <a:sym typeface="Nunito"/>
+            </a:endParaRPr>
+          </a:p>
+          <a:p>
+            <a:pPr indent="-317500" lvl="1" marL="914400" rtl="0" algn="l">
+              <a:spcBef>
+                <a:spcPts val="0"/>
+              </a:spcBef>
+              <a:spcAft>
+                <a:spcPts val="0"/>
+              </a:spcAft>
+              <a:buSzPts val="1400"/>
+              <a:buFont typeface="Nunito"/>
+              <a:buChar char="❏"/>
+            </a:pPr>
+            <a:r>
+              <a:rPr lang="en">
+                <a:latin typeface="Nunito"/>
+                <a:ea typeface="Nunito"/>
+                <a:cs typeface="Nunito"/>
+                <a:sym typeface="Nunito"/>
+              </a:rPr>
+              <a:t>2</a:t>
+            </a:r>
+            <a:endParaRPr>
+              <a:latin typeface="Nunito"/>
+              <a:ea typeface="Nunito"/>
+              <a:cs typeface="Nunito"/>
+              <a:sym typeface="Nunito"/>
+            </a:endParaRPr>
+          </a:p>
+          <a:p>
+            <a:pPr indent="-317500" lvl="1" marL="914400" rtl="0" algn="l">
+              <a:spcBef>
+                <a:spcPts val="0"/>
+              </a:spcBef>
+              <a:spcAft>
+                <a:spcPts val="0"/>
+              </a:spcAft>
+              <a:buSzPts val="1400"/>
+              <a:buFont typeface="Nunito"/>
+              <a:buChar char="❏"/>
+            </a:pPr>
+            <a:r>
+              <a:rPr lang="en">
+                <a:latin typeface="Nunito"/>
+                <a:ea typeface="Nunito"/>
+                <a:cs typeface="Nunito"/>
+                <a:sym typeface="Nunito"/>
+              </a:rPr>
+              <a:t>3</a:t>
+            </a:r>
+            <a:endParaRPr>
+              <a:latin typeface="Nunito"/>
+              <a:ea typeface="Nunito"/>
+              <a:cs typeface="Nunito"/>
+              <a:sym typeface="Nunito"/>
+            </a:endParaRPr>
+          </a:p>
+          <a:p>
+            <a:pPr indent="-317500" lvl="0" marL="457200" rtl="0" algn="l">
+              <a:spcBef>
+                <a:spcPts val="0"/>
+              </a:spcBef>
+              <a:spcAft>
+                <a:spcPts val="0"/>
+              </a:spcAft>
+              <a:buSzPts val="1400"/>
+              <a:buFont typeface="Nunito"/>
+              <a:buChar char="❏"/>
+            </a:pPr>
+            <a:r>
+              <a:rPr lang="en">
+                <a:latin typeface="Nunito"/>
+                <a:ea typeface="Nunito"/>
+                <a:cs typeface="Nunito"/>
+                <a:sym typeface="Nunito"/>
+              </a:rPr>
+              <a:t>Cat 2</a:t>
+            </a:r>
+            <a:endParaRPr>
+              <a:latin typeface="Nunito"/>
+              <a:ea typeface="Nunito"/>
+              <a:cs typeface="Nunito"/>
+              <a:sym typeface="Nunito"/>
+            </a:endParaRPr>
+          </a:p>
+          <a:p>
+            <a:pPr indent="-317500" lvl="0" marL="457200" rtl="0" algn="l">
+              <a:spcBef>
+                <a:spcPts val="0"/>
+              </a:spcBef>
+              <a:spcAft>
+                <a:spcPts val="0"/>
+              </a:spcAft>
+              <a:buSzPts val="1400"/>
+              <a:buFont typeface="Nunito"/>
+              <a:buChar char="❏"/>
+            </a:pPr>
+            <a:r>
+              <a:rPr lang="en">
+                <a:latin typeface="Nunito"/>
+                <a:ea typeface="Nunito"/>
+                <a:cs typeface="Nunito"/>
+                <a:sym typeface="Nunito"/>
+              </a:rPr>
+              <a:t>…</a:t>
+            </a:r>
+            <a:endParaRPr>
+              <a:latin typeface="Nunito"/>
+              <a:ea typeface="Nunito"/>
+              <a:cs typeface="Nunito"/>
+              <a:sym typeface="Nunito"/>
+            </a:endParaRPr>
+          </a:p>
+          <a:p>
+            <a:pPr indent="-317500" lvl="0" marL="457200" rtl="0" algn="l">
+              <a:spcBef>
+                <a:spcPts val="0"/>
+              </a:spcBef>
+              <a:spcAft>
+                <a:spcPts val="0"/>
+              </a:spcAft>
+              <a:buSzPts val="1400"/>
+              <a:buFont typeface="Nunito"/>
+              <a:buChar char="❏"/>
+            </a:pPr>
+            <a:r>
+              <a:rPr lang="en">
+                <a:latin typeface="Nunito"/>
+                <a:ea typeface="Nunito"/>
+                <a:cs typeface="Nunito"/>
+                <a:sym typeface="Nunito"/>
+              </a:rPr>
+              <a:t>…</a:t>
+            </a:r>
+            <a:endParaRPr>
+              <a:latin typeface="Nunito"/>
+              <a:ea typeface="Nunito"/>
+              <a:cs typeface="Nunito"/>
+              <a:sym typeface="Nunito"/>
+            </a:endParaRPr>
+          </a:p>
+          <a:p>
+            <a:pPr indent="-317500" lvl="0" marL="457200" rtl="0" algn="l">
+              <a:spcBef>
+                <a:spcPts val="0"/>
+              </a:spcBef>
+              <a:spcAft>
+                <a:spcPts val="0"/>
+              </a:spcAft>
+              <a:buSzPts val="1400"/>
+              <a:buFont typeface="Nunito"/>
+              <a:buChar char="❏"/>
+            </a:pPr>
+            <a:r>
+              <a:rPr lang="en">
+                <a:latin typeface="Nunito"/>
+                <a:ea typeface="Nunito"/>
+                <a:cs typeface="Nunito"/>
+                <a:sym typeface="Nunito"/>
+              </a:rPr>
+              <a:t>…</a:t>
+            </a:r>
+            <a:endParaRPr>
+              <a:latin typeface="Nunito"/>
+              <a:ea typeface="Nunito"/>
+              <a:cs typeface="Nunito"/>
+              <a:sym typeface="Nunito"/>
+            </a:endParaRPr>
+          </a:p>
+          <a:p>
+            <a:pPr indent="-317500" lvl="0" marL="457200" rtl="0" algn="l">
+              <a:spcBef>
+                <a:spcPts val="0"/>
+              </a:spcBef>
+              <a:spcAft>
+                <a:spcPts val="0"/>
+              </a:spcAft>
+              <a:buSzPts val="1400"/>
+              <a:buFont typeface="Nunito"/>
+              <a:buChar char="❏"/>
+            </a:pPr>
+            <a:r>
+              <a:rPr lang="en">
+                <a:latin typeface="Nunito"/>
+                <a:ea typeface="Nunito"/>
+                <a:cs typeface="Nunito"/>
+                <a:sym typeface="Nunito"/>
+              </a:rPr>
+              <a:t>Cat X</a:t>
+            </a:r>
+            <a:endParaRPr>
+              <a:latin typeface="Nunito"/>
+              <a:ea typeface="Nunito"/>
+              <a:cs typeface="Nunito"/>
+              <a:sym typeface="Nunito"/>
+            </a:endParaRPr>
+          </a:p>
+        </p:txBody>
+      </p:sp>
+      <p:sp>
+        <p:nvSpPr>
+          <p:cNvPr id="385" name="Google Shape;385;p28"/>
+          <p:cNvSpPr txBox="1"/>
+          <p:nvPr/>
+        </p:nvSpPr>
+        <p:spPr>
+          <a:xfrm>
+            <a:off x="7116175" y="1492700"/>
+            <a:ext cx="938700" cy="400200"/>
+          </a:xfrm>
+          <a:prstGeom prst="rect">
+            <a:avLst/>
+          </a:prstGeom>
+          <a:noFill/>
+          <a:ln>
+            <a:noFill/>
+          </a:ln>
+        </p:spPr>
+        <p:txBody>
+          <a:bodyPr anchorCtr="0" anchor="t" bIns="91425" lIns="91425" spcFirstLastPara="1" rIns="91425" wrap="square" tIns="91425">
+            <a:spAutoFit/>
+          </a:bodyPr>
+          <a:lstStyle/>
+          <a:p>
+            <a:pPr indent="0" lvl="0" marL="0" rtl="0" algn="l">
+              <a:spcBef>
+                <a:spcPts val="0"/>
+              </a:spcBef>
+              <a:spcAft>
+                <a:spcPts val="0"/>
+              </a:spcAft>
+              <a:buNone/>
+            </a:pPr>
+            <a:r>
+              <a:rPr lang="en">
+                <a:latin typeface="Nunito"/>
+                <a:ea typeface="Nunito"/>
+                <a:cs typeface="Nunito"/>
+                <a:sym typeface="Nunito"/>
+              </a:rPr>
+              <a:t>Results</a:t>
+            </a:r>
+            <a:endParaRPr>
+              <a:latin typeface="Nunito"/>
+              <a:ea typeface="Nunito"/>
+              <a:cs typeface="Nunito"/>
+              <a:sym typeface="Nunito"/>
+            </a:endParaRPr>
+          </a:p>
+        </p:txBody>
+      </p:sp>
+      <p:sp>
+        <p:nvSpPr>
+          <p:cNvPr id="386" name="Google Shape;386;p28"/>
+          <p:cNvSpPr txBox="1"/>
+          <p:nvPr/>
+        </p:nvSpPr>
+        <p:spPr>
+          <a:xfrm>
+            <a:off x="3581575" y="1990275"/>
+            <a:ext cx="2206200" cy="400200"/>
+          </a:xfrm>
+          <a:prstGeom prst="rect">
+            <a:avLst/>
+          </a:prstGeom>
+          <a:noFill/>
+          <a:ln>
+            <a:noFill/>
+          </a:ln>
+        </p:spPr>
+        <p:txBody>
+          <a:bodyPr anchorCtr="0" anchor="t" bIns="91425" lIns="91425" spcFirstLastPara="1" rIns="91425" wrap="square" tIns="91425">
+            <a:spAutoFit/>
+          </a:bodyPr>
+          <a:lstStyle/>
+          <a:p>
+            <a:pPr indent="0" lvl="0" marL="0" rtl="0" algn="l">
+              <a:spcBef>
+                <a:spcPts val="0"/>
+              </a:spcBef>
+              <a:spcAft>
+                <a:spcPts val="0"/>
+              </a:spcAft>
+              <a:buNone/>
+            </a:pPr>
+            <a:r>
+              <a:rPr lang="en">
+                <a:latin typeface="Nunito"/>
+                <a:ea typeface="Nunito"/>
+                <a:cs typeface="Nunito"/>
+                <a:sym typeface="Nunito"/>
+              </a:rPr>
+              <a:t>Map of United States</a:t>
+            </a:r>
+            <a:endParaRPr>
+              <a:latin typeface="Nunito"/>
+              <a:ea typeface="Nunito"/>
+              <a:cs typeface="Nunito"/>
+              <a:sym typeface="Nunito"/>
+            </a:endParaRPr>
+          </a:p>
+        </p:txBody>
+      </p:sp>
+      <p:sp>
+        <p:nvSpPr>
+          <p:cNvPr id="387" name="Google Shape;387;p28"/>
+          <p:cNvSpPr/>
+          <p:nvPr/>
+        </p:nvSpPr>
+        <p:spPr>
+          <a:xfrm>
+            <a:off x="2713150" y="3436050"/>
+            <a:ext cx="4158900" cy="873000"/>
+          </a:xfrm>
+          <a:prstGeom prst="rect">
+            <a:avLst/>
+          </a:prstGeom>
+          <a:noFill/>
+          <a:ln cap="flat" cmpd="sng" w="19050">
+            <a:solidFill>
+              <a:schemeClr val="lt1"/>
+            </a:solidFill>
+            <a:prstDash val="solid"/>
+            <a:round/>
+            <a:headEnd len="sm" w="sm" type="none"/>
+            <a:tailEnd len="sm" w="sm" type="none"/>
+          </a:ln>
+        </p:spPr>
+        <p:txBody>
+          <a:bodyPr anchorCtr="0" anchor="ctr" bIns="91425" lIns="91425" spcFirstLastPara="1" rIns="91425" wrap="square" tIns="91425">
+            <a:noAutofit/>
+          </a:bodyPr>
+          <a:lstStyle/>
+          <a:p>
+            <a:pPr indent="0" lvl="0" marL="0" rtl="0" algn="l">
+              <a:spcBef>
+                <a:spcPts val="0"/>
+              </a:spcBef>
+              <a:spcAft>
+                <a:spcPts val="0"/>
+              </a:spcAft>
+              <a:buNone/>
+            </a:pPr>
+            <a:r>
+              <a:t/>
+            </a:r>
+            <a:endParaRPr/>
+          </a:p>
+        </p:txBody>
+      </p:sp>
+      <p:sp>
+        <p:nvSpPr>
+          <p:cNvPr id="388" name="Google Shape;388;p28"/>
+          <p:cNvSpPr txBox="1"/>
+          <p:nvPr/>
+        </p:nvSpPr>
+        <p:spPr>
+          <a:xfrm>
+            <a:off x="3511150" y="3670750"/>
+            <a:ext cx="2502000" cy="400200"/>
+          </a:xfrm>
+          <a:prstGeom prst="rect">
+            <a:avLst/>
+          </a:prstGeom>
+          <a:noFill/>
+          <a:ln>
+            <a:noFill/>
+          </a:ln>
+        </p:spPr>
+        <p:txBody>
+          <a:bodyPr anchorCtr="0" anchor="t" bIns="91425" lIns="91425" spcFirstLastPara="1" rIns="91425" wrap="square" tIns="91425">
+            <a:spAutoFit/>
+          </a:bodyPr>
+          <a:lstStyle/>
+          <a:p>
+            <a:pPr indent="0" lvl="0" marL="0" rtl="0" algn="l">
+              <a:spcBef>
+                <a:spcPts val="0"/>
+              </a:spcBef>
+              <a:spcAft>
+                <a:spcPts val="0"/>
+              </a:spcAft>
+              <a:buNone/>
+            </a:pPr>
+            <a:r>
+              <a:rPr lang="en">
+                <a:latin typeface="Nunito"/>
+                <a:ea typeface="Nunito"/>
+                <a:cs typeface="Nunito"/>
+                <a:sym typeface="Nunito"/>
+              </a:rPr>
+              <a:t>Graphs aggregating results</a:t>
+            </a:r>
+            <a:endParaRPr>
               <a:latin typeface="Nunito"/>
               <a:ea typeface="Nunito"/>
               <a:cs typeface="Nunito"/>
@@ -18146,7 +18907,7 @@
   <p:cSld>
     <p:spTree>
       <p:nvGrpSpPr>
-        <p:cNvPr id="382" name="Shape 382"/>
+        <p:cNvPr id="392" name="Shape 392"/>
         <p:cNvGrpSpPr/>
         <p:nvPr/>
       </p:nvGrpSpPr>
@@ -18160,7 +18921,7 @@
       </p:grpSpPr>
       <p:sp>
         <p:nvSpPr>
-          <p:cNvPr id="383" name="Google Shape;383;p29"/>
+          <p:cNvPr id="393" name="Google Shape;393;p29"/>
           <p:cNvSpPr txBox="1"/>
           <p:nvPr>
             <p:ph type="title"/>
@@ -18200,7 +18961,7 @@
       </p:sp>
       <p:sp>
         <p:nvSpPr>
-          <p:cNvPr id="384" name="Google Shape;384;p29"/>
+          <p:cNvPr id="394" name="Google Shape;394;p29"/>
           <p:cNvSpPr txBox="1"/>
           <p:nvPr>
             <p:ph idx="1" type="body"/>
@@ -18286,7 +19047,7 @@
   <p:cSld>
     <p:spTree>
       <p:nvGrpSpPr>
-        <p:cNvPr id="388" name="Shape 388"/>
+        <p:cNvPr id="398" name="Shape 398"/>
         <p:cNvGrpSpPr/>
         <p:nvPr/>
       </p:nvGrpSpPr>
@@ -18300,7 +19061,7 @@
       </p:grpSpPr>
       <p:sp>
         <p:nvSpPr>
-          <p:cNvPr id="389" name="Google Shape;389;p30"/>
+          <p:cNvPr id="399" name="Google Shape;399;p30"/>
           <p:cNvSpPr txBox="1"/>
           <p:nvPr>
             <p:ph type="title"/>
@@ -18340,7 +19101,7 @@
       </p:sp>
       <p:sp>
         <p:nvSpPr>
-          <p:cNvPr id="390" name="Google Shape;390;p30"/>
+          <p:cNvPr id="400" name="Google Shape;400;p30"/>
           <p:cNvSpPr txBox="1"/>
           <p:nvPr>
             <p:ph idx="1" type="body"/>

</xml_diff>